<commit_message>
Updated Lecture 11 and Lab 10
</commit_message>
<xml_diff>
--- a/Lectures/CITS5503EMobile.pptx
+++ b/Lectures/CITS5503EMobile.pptx
@@ -5,26 +5,30 @@
     <p:sldMasterId id="2147483694" r:id="rId1"/>
   </p:sldMasterIdLst>
   <p:notesMasterIdLst>
-    <p:notesMasterId r:id="rId16"/>
+    <p:notesMasterId r:id="rId20"/>
   </p:notesMasterIdLst>
   <p:handoutMasterIdLst>
-    <p:handoutMasterId r:id="rId17"/>
+    <p:handoutMasterId r:id="rId21"/>
   </p:handoutMasterIdLst>
   <p:sldIdLst>
     <p:sldId id="1337" r:id="rId2"/>
     <p:sldId id="1326" r:id="rId3"/>
     <p:sldId id="1332" r:id="rId4"/>
     <p:sldId id="1338" r:id="rId5"/>
-    <p:sldId id="1339" r:id="rId6"/>
-    <p:sldId id="1340" r:id="rId7"/>
-    <p:sldId id="1341" r:id="rId8"/>
-    <p:sldId id="1342" r:id="rId9"/>
-    <p:sldId id="1345" r:id="rId10"/>
-    <p:sldId id="1344" r:id="rId11"/>
-    <p:sldId id="1346" r:id="rId12"/>
-    <p:sldId id="1347" r:id="rId13"/>
-    <p:sldId id="1348" r:id="rId14"/>
-    <p:sldId id="1349" r:id="rId15"/>
+    <p:sldId id="1350" r:id="rId6"/>
+    <p:sldId id="1351" r:id="rId7"/>
+    <p:sldId id="1352" r:id="rId8"/>
+    <p:sldId id="1339" r:id="rId9"/>
+    <p:sldId id="1340" r:id="rId10"/>
+    <p:sldId id="1341" r:id="rId11"/>
+    <p:sldId id="1342" r:id="rId12"/>
+    <p:sldId id="1345" r:id="rId13"/>
+    <p:sldId id="1344" r:id="rId14"/>
+    <p:sldId id="1346" r:id="rId15"/>
+    <p:sldId id="1347" r:id="rId16"/>
+    <p:sldId id="1348" r:id="rId17"/>
+    <p:sldId id="1349" r:id="rId18"/>
+    <p:sldId id="1353" r:id="rId19"/>
   </p:sldIdLst>
   <p:sldSz cx="12192000" cy="6858000"/>
   <p:notesSz cx="9601200" cy="7315200"/>
@@ -1090,7 +1094,7 @@
     </p:spTree>
     <p:extLst>
       <p:ext uri="{BB962C8B-B14F-4D97-AF65-F5344CB8AC3E}">
-        <p14:creationId xmlns:p14="http://schemas.microsoft.com/office/powerpoint/2010/main" val="1917387135"/>
+        <p14:creationId xmlns:p14="http://schemas.microsoft.com/office/powerpoint/2010/main" val="3512710097"/>
       </p:ext>
     </p:extLst>
   </p:cSld>
@@ -1175,7 +1179,7 @@
     </p:spTree>
     <p:extLst>
       <p:ext uri="{BB962C8B-B14F-4D97-AF65-F5344CB8AC3E}">
-        <p14:creationId xmlns:p14="http://schemas.microsoft.com/office/powerpoint/2010/main" val="631117858"/>
+        <p14:creationId xmlns:p14="http://schemas.microsoft.com/office/powerpoint/2010/main" val="3773704964"/>
       </p:ext>
     </p:extLst>
   </p:cSld>
@@ -1260,7 +1264,7 @@
     </p:spTree>
     <p:extLst>
       <p:ext uri="{BB962C8B-B14F-4D97-AF65-F5344CB8AC3E}">
-        <p14:creationId xmlns:p14="http://schemas.microsoft.com/office/powerpoint/2010/main" val="3855851175"/>
+        <p14:creationId xmlns:p14="http://schemas.microsoft.com/office/powerpoint/2010/main" val="2642543429"/>
       </p:ext>
     </p:extLst>
   </p:cSld>
@@ -1345,7 +1349,7 @@
     </p:spTree>
     <p:extLst>
       <p:ext uri="{BB962C8B-B14F-4D97-AF65-F5344CB8AC3E}">
-        <p14:creationId xmlns:p14="http://schemas.microsoft.com/office/powerpoint/2010/main" val="2872059255"/>
+        <p14:creationId xmlns:p14="http://schemas.microsoft.com/office/powerpoint/2010/main" val="1917387135"/>
       </p:ext>
     </p:extLst>
   </p:cSld>
@@ -1430,7 +1434,347 @@
     </p:spTree>
     <p:extLst>
       <p:ext uri="{BB962C8B-B14F-4D97-AF65-F5344CB8AC3E}">
+        <p14:creationId xmlns:p14="http://schemas.microsoft.com/office/powerpoint/2010/main" val="631117858"/>
+      </p:ext>
+    </p:extLst>
+  </p:cSld>
+  <p:clrMapOvr>
+    <a:masterClrMapping/>
+  </p:clrMapOvr>
+</p:notes>
+</file>
+
+<file path=ppt/notesSlides/notesSlide15.xml><?xml version="1.0" encoding="utf-8"?>
+<p:notes xmlns:a="http://schemas.openxmlformats.org/drawingml/2006/main" xmlns:r="http://schemas.openxmlformats.org/officeDocument/2006/relationships" xmlns:p="http://schemas.openxmlformats.org/presentationml/2006/main">
+  <p:cSld>
+    <p:spTree>
+      <p:nvGrpSpPr>
+        <p:cNvPr id="1" name=""/>
+        <p:cNvGrpSpPr/>
+        <p:nvPr/>
+      </p:nvGrpSpPr>
+      <p:grpSpPr>
+        <a:xfrm>
+          <a:off x="0" y="0"/>
+          <a:ext cx="0" cy="0"/>
+          <a:chOff x="0" y="0"/>
+          <a:chExt cx="0" cy="0"/>
+        </a:xfrm>
+      </p:grpSpPr>
+      <p:sp>
+        <p:nvSpPr>
+          <p:cNvPr id="2" name="Slide Image Placeholder 1"/>
+          <p:cNvSpPr>
+            <a:spLocks noGrp="1" noRot="1" noChangeAspect="1"/>
+          </p:cNvSpPr>
+          <p:nvPr>
+            <p:ph type="sldImg"/>
+          </p:nvPr>
+        </p:nvSpPr>
+        <p:spPr/>
+      </p:sp>
+      <p:sp>
+        <p:nvSpPr>
+          <p:cNvPr id="3" name="Notes Placeholder 2"/>
+          <p:cNvSpPr>
+            <a:spLocks noGrp="1"/>
+          </p:cNvSpPr>
+          <p:nvPr>
+            <p:ph type="body" idx="1"/>
+          </p:nvPr>
+        </p:nvSpPr>
+        <p:spPr/>
+        <p:txBody>
+          <a:bodyPr/>
+          <a:lstStyle/>
+          <a:p>
+            <a:endParaRPr lang="en-US"/>
+          </a:p>
+        </p:txBody>
+      </p:sp>
+      <p:sp>
+        <p:nvSpPr>
+          <p:cNvPr id="4" name="Slide Number Placeholder 3"/>
+          <p:cNvSpPr>
+            <a:spLocks noGrp="1"/>
+          </p:cNvSpPr>
+          <p:nvPr>
+            <p:ph type="sldNum" sz="quarter" idx="5"/>
+          </p:nvPr>
+        </p:nvSpPr>
+        <p:spPr/>
+        <p:txBody>
+          <a:bodyPr/>
+          <a:lstStyle/>
+          <a:p>
+            <a:fld id="{D37F8DB4-A4FF-4A8B-9A85-9B1874A58FCC}" type="slidenum">
+              <a:rPr lang="en-US" smtClean="0"/>
+              <a:pPr/>
+              <a:t>15</a:t>
+            </a:fld>
+            <a:endParaRPr lang="en-US"/>
+          </a:p>
+        </p:txBody>
+      </p:sp>
+    </p:spTree>
+    <p:extLst>
+      <p:ext uri="{BB962C8B-B14F-4D97-AF65-F5344CB8AC3E}">
+        <p14:creationId xmlns:p14="http://schemas.microsoft.com/office/powerpoint/2010/main" val="3855851175"/>
+      </p:ext>
+    </p:extLst>
+  </p:cSld>
+  <p:clrMapOvr>
+    <a:masterClrMapping/>
+  </p:clrMapOvr>
+</p:notes>
+</file>
+
+<file path=ppt/notesSlides/notesSlide16.xml><?xml version="1.0" encoding="utf-8"?>
+<p:notes xmlns:a="http://schemas.openxmlformats.org/drawingml/2006/main" xmlns:r="http://schemas.openxmlformats.org/officeDocument/2006/relationships" xmlns:p="http://schemas.openxmlformats.org/presentationml/2006/main">
+  <p:cSld>
+    <p:spTree>
+      <p:nvGrpSpPr>
+        <p:cNvPr id="1" name=""/>
+        <p:cNvGrpSpPr/>
+        <p:nvPr/>
+      </p:nvGrpSpPr>
+      <p:grpSpPr>
+        <a:xfrm>
+          <a:off x="0" y="0"/>
+          <a:ext cx="0" cy="0"/>
+          <a:chOff x="0" y="0"/>
+          <a:chExt cx="0" cy="0"/>
+        </a:xfrm>
+      </p:grpSpPr>
+      <p:sp>
+        <p:nvSpPr>
+          <p:cNvPr id="2" name="Slide Image Placeholder 1"/>
+          <p:cNvSpPr>
+            <a:spLocks noGrp="1" noRot="1" noChangeAspect="1"/>
+          </p:cNvSpPr>
+          <p:nvPr>
+            <p:ph type="sldImg"/>
+          </p:nvPr>
+        </p:nvSpPr>
+        <p:spPr/>
+      </p:sp>
+      <p:sp>
+        <p:nvSpPr>
+          <p:cNvPr id="3" name="Notes Placeholder 2"/>
+          <p:cNvSpPr>
+            <a:spLocks noGrp="1"/>
+          </p:cNvSpPr>
+          <p:nvPr>
+            <p:ph type="body" idx="1"/>
+          </p:nvPr>
+        </p:nvSpPr>
+        <p:spPr/>
+        <p:txBody>
+          <a:bodyPr/>
+          <a:lstStyle/>
+          <a:p>
+            <a:endParaRPr lang="en-US"/>
+          </a:p>
+        </p:txBody>
+      </p:sp>
+      <p:sp>
+        <p:nvSpPr>
+          <p:cNvPr id="4" name="Slide Number Placeholder 3"/>
+          <p:cNvSpPr>
+            <a:spLocks noGrp="1"/>
+          </p:cNvSpPr>
+          <p:nvPr>
+            <p:ph type="sldNum" sz="quarter" idx="5"/>
+          </p:nvPr>
+        </p:nvSpPr>
+        <p:spPr/>
+        <p:txBody>
+          <a:bodyPr/>
+          <a:lstStyle/>
+          <a:p>
+            <a:fld id="{D37F8DB4-A4FF-4A8B-9A85-9B1874A58FCC}" type="slidenum">
+              <a:rPr lang="en-US" smtClean="0"/>
+              <a:pPr/>
+              <a:t>16</a:t>
+            </a:fld>
+            <a:endParaRPr lang="en-US"/>
+          </a:p>
+        </p:txBody>
+      </p:sp>
+    </p:spTree>
+    <p:extLst>
+      <p:ext uri="{BB962C8B-B14F-4D97-AF65-F5344CB8AC3E}">
+        <p14:creationId xmlns:p14="http://schemas.microsoft.com/office/powerpoint/2010/main" val="2872059255"/>
+      </p:ext>
+    </p:extLst>
+  </p:cSld>
+  <p:clrMapOvr>
+    <a:masterClrMapping/>
+  </p:clrMapOvr>
+</p:notes>
+</file>
+
+<file path=ppt/notesSlides/notesSlide17.xml><?xml version="1.0" encoding="utf-8"?>
+<p:notes xmlns:a="http://schemas.openxmlformats.org/drawingml/2006/main" xmlns:r="http://schemas.openxmlformats.org/officeDocument/2006/relationships" xmlns:p="http://schemas.openxmlformats.org/presentationml/2006/main">
+  <p:cSld>
+    <p:spTree>
+      <p:nvGrpSpPr>
+        <p:cNvPr id="1" name=""/>
+        <p:cNvGrpSpPr/>
+        <p:nvPr/>
+      </p:nvGrpSpPr>
+      <p:grpSpPr>
+        <a:xfrm>
+          <a:off x="0" y="0"/>
+          <a:ext cx="0" cy="0"/>
+          <a:chOff x="0" y="0"/>
+          <a:chExt cx="0" cy="0"/>
+        </a:xfrm>
+      </p:grpSpPr>
+      <p:sp>
+        <p:nvSpPr>
+          <p:cNvPr id="2" name="Slide Image Placeholder 1"/>
+          <p:cNvSpPr>
+            <a:spLocks noGrp="1" noRot="1" noChangeAspect="1"/>
+          </p:cNvSpPr>
+          <p:nvPr>
+            <p:ph type="sldImg"/>
+          </p:nvPr>
+        </p:nvSpPr>
+        <p:spPr/>
+      </p:sp>
+      <p:sp>
+        <p:nvSpPr>
+          <p:cNvPr id="3" name="Notes Placeholder 2"/>
+          <p:cNvSpPr>
+            <a:spLocks noGrp="1"/>
+          </p:cNvSpPr>
+          <p:nvPr>
+            <p:ph type="body" idx="1"/>
+          </p:nvPr>
+        </p:nvSpPr>
+        <p:spPr/>
+        <p:txBody>
+          <a:bodyPr/>
+          <a:lstStyle/>
+          <a:p>
+            <a:endParaRPr lang="en-US"/>
+          </a:p>
+        </p:txBody>
+      </p:sp>
+      <p:sp>
+        <p:nvSpPr>
+          <p:cNvPr id="4" name="Slide Number Placeholder 3"/>
+          <p:cNvSpPr>
+            <a:spLocks noGrp="1"/>
+          </p:cNvSpPr>
+          <p:nvPr>
+            <p:ph type="sldNum" sz="quarter" idx="5"/>
+          </p:nvPr>
+        </p:nvSpPr>
+        <p:spPr/>
+        <p:txBody>
+          <a:bodyPr/>
+          <a:lstStyle/>
+          <a:p>
+            <a:fld id="{D37F8DB4-A4FF-4A8B-9A85-9B1874A58FCC}" type="slidenum">
+              <a:rPr lang="en-US" smtClean="0"/>
+              <a:pPr/>
+              <a:t>17</a:t>
+            </a:fld>
+            <a:endParaRPr lang="en-US"/>
+          </a:p>
+        </p:txBody>
+      </p:sp>
+    </p:spTree>
+    <p:extLst>
+      <p:ext uri="{BB962C8B-B14F-4D97-AF65-F5344CB8AC3E}">
         <p14:creationId xmlns:p14="http://schemas.microsoft.com/office/powerpoint/2010/main" val="1344633399"/>
+      </p:ext>
+    </p:extLst>
+  </p:cSld>
+  <p:clrMapOvr>
+    <a:masterClrMapping/>
+  </p:clrMapOvr>
+</p:notes>
+</file>
+
+<file path=ppt/notesSlides/notesSlide18.xml><?xml version="1.0" encoding="utf-8"?>
+<p:notes xmlns:a="http://schemas.openxmlformats.org/drawingml/2006/main" xmlns:r="http://schemas.openxmlformats.org/officeDocument/2006/relationships" xmlns:p="http://schemas.openxmlformats.org/presentationml/2006/main">
+  <p:cSld>
+    <p:spTree>
+      <p:nvGrpSpPr>
+        <p:cNvPr id="1" name=""/>
+        <p:cNvGrpSpPr/>
+        <p:nvPr/>
+      </p:nvGrpSpPr>
+      <p:grpSpPr>
+        <a:xfrm>
+          <a:off x="0" y="0"/>
+          <a:ext cx="0" cy="0"/>
+          <a:chOff x="0" y="0"/>
+          <a:chExt cx="0" cy="0"/>
+        </a:xfrm>
+      </p:grpSpPr>
+      <p:sp>
+        <p:nvSpPr>
+          <p:cNvPr id="2" name="Slide Image Placeholder 1"/>
+          <p:cNvSpPr>
+            <a:spLocks noGrp="1" noRot="1" noChangeAspect="1"/>
+          </p:cNvSpPr>
+          <p:nvPr>
+            <p:ph type="sldImg"/>
+          </p:nvPr>
+        </p:nvSpPr>
+        <p:spPr/>
+      </p:sp>
+      <p:sp>
+        <p:nvSpPr>
+          <p:cNvPr id="3" name="Notes Placeholder 2"/>
+          <p:cNvSpPr>
+            <a:spLocks noGrp="1"/>
+          </p:cNvSpPr>
+          <p:nvPr>
+            <p:ph type="body" idx="1"/>
+          </p:nvPr>
+        </p:nvSpPr>
+        <p:spPr/>
+        <p:txBody>
+          <a:bodyPr/>
+          <a:lstStyle/>
+          <a:p>
+            <a:endParaRPr lang="en-US"/>
+          </a:p>
+        </p:txBody>
+      </p:sp>
+      <p:sp>
+        <p:nvSpPr>
+          <p:cNvPr id="4" name="Slide Number Placeholder 3"/>
+          <p:cNvSpPr>
+            <a:spLocks noGrp="1"/>
+          </p:cNvSpPr>
+          <p:nvPr>
+            <p:ph type="sldNum" sz="quarter" idx="5"/>
+          </p:nvPr>
+        </p:nvSpPr>
+        <p:spPr/>
+        <p:txBody>
+          <a:bodyPr/>
+          <a:lstStyle/>
+          <a:p>
+            <a:fld id="{D37F8DB4-A4FF-4A8B-9A85-9B1874A58FCC}" type="slidenum">
+              <a:rPr lang="en-US" smtClean="0"/>
+              <a:pPr/>
+              <a:t>18</a:t>
+            </a:fld>
+            <a:endParaRPr lang="en-US"/>
+          </a:p>
+        </p:txBody>
+      </p:sp>
+    </p:spTree>
+    <p:extLst>
+      <p:ext uri="{BB962C8B-B14F-4D97-AF65-F5344CB8AC3E}">
+        <p14:creationId xmlns:p14="http://schemas.microsoft.com/office/powerpoint/2010/main" val="3904733132"/>
       </p:ext>
     </p:extLst>
   </p:cSld>
@@ -1770,7 +2114,7 @@
     </p:spTree>
     <p:extLst>
       <p:ext uri="{BB962C8B-B14F-4D97-AF65-F5344CB8AC3E}">
-        <p14:creationId xmlns:p14="http://schemas.microsoft.com/office/powerpoint/2010/main" val="1431290176"/>
+        <p14:creationId xmlns:p14="http://schemas.microsoft.com/office/powerpoint/2010/main" val="2277682812"/>
       </p:ext>
     </p:extLst>
   </p:cSld>
@@ -1855,7 +2199,7 @@
     </p:spTree>
     <p:extLst>
       <p:ext uri="{BB962C8B-B14F-4D97-AF65-F5344CB8AC3E}">
-        <p14:creationId xmlns:p14="http://schemas.microsoft.com/office/powerpoint/2010/main" val="2070908266"/>
+        <p14:creationId xmlns:p14="http://schemas.microsoft.com/office/powerpoint/2010/main" val="1876355443"/>
       </p:ext>
     </p:extLst>
   </p:cSld>
@@ -1940,7 +2284,7 @@
     </p:spTree>
     <p:extLst>
       <p:ext uri="{BB962C8B-B14F-4D97-AF65-F5344CB8AC3E}">
-        <p14:creationId xmlns:p14="http://schemas.microsoft.com/office/powerpoint/2010/main" val="3512710097"/>
+        <p14:creationId xmlns:p14="http://schemas.microsoft.com/office/powerpoint/2010/main" val="2036070859"/>
       </p:ext>
     </p:extLst>
   </p:cSld>
@@ -2025,7 +2369,7 @@
     </p:spTree>
     <p:extLst>
       <p:ext uri="{BB962C8B-B14F-4D97-AF65-F5344CB8AC3E}">
-        <p14:creationId xmlns:p14="http://schemas.microsoft.com/office/powerpoint/2010/main" val="3773704964"/>
+        <p14:creationId xmlns:p14="http://schemas.microsoft.com/office/powerpoint/2010/main" val="1431290176"/>
       </p:ext>
     </p:extLst>
   </p:cSld>
@@ -2110,7 +2454,7 @@
     </p:spTree>
     <p:extLst>
       <p:ext uri="{BB962C8B-B14F-4D97-AF65-F5344CB8AC3E}">
-        <p14:creationId xmlns:p14="http://schemas.microsoft.com/office/powerpoint/2010/main" val="2642543429"/>
+        <p14:creationId xmlns:p14="http://schemas.microsoft.com/office/powerpoint/2010/main" val="2070908266"/>
       </p:ext>
     </p:extLst>
   </p:cSld>
@@ -6045,6 +6389,634 @@
 <file path=ppt/slides/slide10.xml><?xml version="1.0" encoding="utf-8"?>
 <p:sld xmlns:a="http://schemas.openxmlformats.org/drawingml/2006/main" xmlns:r="http://schemas.openxmlformats.org/officeDocument/2006/relationships" xmlns:p="http://schemas.openxmlformats.org/presentationml/2006/main">
   <p:cSld>
+    <p:spTree>
+      <p:nvGrpSpPr>
+        <p:cNvPr id="1" name=""/>
+        <p:cNvGrpSpPr/>
+        <p:nvPr/>
+      </p:nvGrpSpPr>
+      <p:grpSpPr>
+        <a:xfrm>
+          <a:off x="0" y="0"/>
+          <a:ext cx="0" cy="0"/>
+          <a:chOff x="0" y="0"/>
+          <a:chExt cx="0" cy="0"/>
+        </a:xfrm>
+      </p:grpSpPr>
+      <p:sp>
+        <p:nvSpPr>
+          <p:cNvPr id="2" name="Title 1">
+            <a:extLst>
+              <a:ext uri="{FF2B5EF4-FFF2-40B4-BE49-F238E27FC236}">
+                <a16:creationId xmlns:a16="http://schemas.microsoft.com/office/drawing/2014/main" id="{149117BA-DC69-EE40-820D-2383D5BEFC43}"/>
+              </a:ext>
+            </a:extLst>
+          </p:cNvPr>
+          <p:cNvSpPr>
+            <a:spLocks noGrp="1"/>
+          </p:cNvSpPr>
+          <p:nvPr>
+            <p:ph type="title"/>
+          </p:nvPr>
+        </p:nvSpPr>
+        <p:spPr>
+          <a:xfrm>
+            <a:off x="838200" y="695986"/>
+            <a:ext cx="10515600" cy="1325563"/>
+          </a:xfrm>
+        </p:spPr>
+        <p:txBody>
+          <a:bodyPr/>
+          <a:lstStyle/>
+          <a:p>
+            <a:r>
+              <a:rPr lang="en-US" dirty="0"/>
+              <a:t>Custom events</a:t>
+            </a:r>
+          </a:p>
+        </p:txBody>
+      </p:sp>
+      <p:sp>
+        <p:nvSpPr>
+          <p:cNvPr id="3" name="Content Placeholder 2">
+            <a:extLst>
+              <a:ext uri="{FF2B5EF4-FFF2-40B4-BE49-F238E27FC236}">
+                <a16:creationId xmlns:a16="http://schemas.microsoft.com/office/drawing/2014/main" id="{49A60402-E9D3-3C4B-B9DD-F3635E766DAD}"/>
+              </a:ext>
+            </a:extLst>
+          </p:cNvPr>
+          <p:cNvSpPr>
+            <a:spLocks noGrp="1"/>
+          </p:cNvSpPr>
+          <p:nvPr>
+            <p:ph idx="1"/>
+          </p:nvPr>
+        </p:nvSpPr>
+        <p:spPr/>
+        <p:txBody>
+          <a:bodyPr/>
+          <a:lstStyle/>
+          <a:p>
+            <a:r>
+              <a:rPr lang="en-US" dirty="0"/>
+              <a:t>Sending a new note/delete note event</a:t>
+            </a:r>
+          </a:p>
+          <a:p>
+            <a:endParaRPr lang="en-US" dirty="0"/>
+          </a:p>
+        </p:txBody>
+      </p:sp>
+      <p:sp>
+        <p:nvSpPr>
+          <p:cNvPr id="6" name="Rectangle 5">
+            <a:extLst>
+              <a:ext uri="{FF2B5EF4-FFF2-40B4-BE49-F238E27FC236}">
+                <a16:creationId xmlns:a16="http://schemas.microsoft.com/office/drawing/2014/main" id="{E007DE48-D83D-E043-A459-52149D0D4844}"/>
+              </a:ext>
+            </a:extLst>
+          </p:cNvPr>
+          <p:cNvSpPr/>
+          <p:nvPr/>
+        </p:nvSpPr>
+        <p:spPr>
+          <a:xfrm>
+            <a:off x="265426" y="2918714"/>
+            <a:ext cx="11661147" cy="2985976"/>
+          </a:xfrm>
+          <a:prstGeom prst="rect">
+            <a:avLst/>
+          </a:prstGeom>
+          <a:solidFill>
+            <a:schemeClr val="bg1">
+              <a:lumMod val="85000"/>
+            </a:schemeClr>
+          </a:solidFill>
+        </p:spPr>
+        <p:style>
+          <a:lnRef idx="2">
+            <a:schemeClr val="accent1">
+              <a:shade val="50000"/>
+            </a:schemeClr>
+          </a:lnRef>
+          <a:fillRef idx="1">
+            <a:schemeClr val="accent1"/>
+          </a:fillRef>
+          <a:effectRef idx="0">
+            <a:schemeClr val="accent1"/>
+          </a:effectRef>
+          <a:fontRef idx="minor">
+            <a:schemeClr val="lt1"/>
+          </a:fontRef>
+        </p:style>
+        <p:txBody>
+          <a:bodyPr rtlCol="0" anchor="t"/>
+          <a:lstStyle/>
+          <a:p>
+            <a:pPr algn="l"/>
+            <a:r>
+              <a:rPr lang="en-AU" sz="1600" dirty="0">
+                <a:solidFill>
+                  <a:schemeClr val="tx1"/>
+                </a:solidFill>
+              </a:rPr>
+              <a:t>// send add note event</a:t>
+            </a:r>
+          </a:p>
+          <a:p>
+            <a:pPr algn="l"/>
+            <a:endParaRPr lang="en-AU" sz="1600" dirty="0">
+              <a:solidFill>
+                <a:schemeClr val="tx1"/>
+              </a:solidFill>
+            </a:endParaRPr>
+          </a:p>
+          <a:p>
+            <a:pPr algn="l"/>
+            <a:r>
+              <a:rPr lang="en-AU" sz="1600" dirty="0" err="1">
+                <a:solidFill>
+                  <a:schemeClr val="tx1"/>
+                </a:solidFill>
+              </a:rPr>
+              <a:t>sendNoteEvent</a:t>
+            </a:r>
+            <a:r>
+              <a:rPr lang="en-AU" sz="1600" dirty="0">
+                <a:solidFill>
+                  <a:schemeClr val="tx1"/>
+                </a:solidFill>
+              </a:rPr>
+              <a:t>(</a:t>
+            </a:r>
+            <a:r>
+              <a:rPr lang="en-AU" sz="1600" dirty="0" err="1">
+                <a:solidFill>
+                  <a:schemeClr val="tx1"/>
+                </a:solidFill>
+              </a:rPr>
+              <a:t>noteId</a:t>
+            </a:r>
+            <a:r>
+              <a:rPr lang="en-AU" sz="1600" dirty="0">
+                <a:solidFill>
+                  <a:schemeClr val="tx1"/>
+                </a:solidFill>
+              </a:rPr>
+              <a:t>: </a:t>
+            </a:r>
+            <a:r>
+              <a:rPr lang="en-AU" sz="1600" dirty="0" err="1">
+                <a:solidFill>
+                  <a:schemeClr val="tx1"/>
+                </a:solidFill>
+              </a:rPr>
+              <a:t>newNoteId</a:t>
+            </a:r>
+            <a:r>
+              <a:rPr lang="en-AU" sz="1600" dirty="0">
+                <a:solidFill>
+                  <a:schemeClr val="tx1"/>
+                </a:solidFill>
+              </a:rPr>
+              <a:t>, </a:t>
+            </a:r>
+            <a:r>
+              <a:rPr lang="en-AU" sz="1600" dirty="0" err="1">
+                <a:solidFill>
+                  <a:schemeClr val="tx1"/>
+                </a:solidFill>
+              </a:rPr>
+              <a:t>eventType</a:t>
+            </a:r>
+            <a:r>
+              <a:rPr lang="en-AU" sz="1600" dirty="0">
+                <a:solidFill>
+                  <a:schemeClr val="tx1"/>
+                </a:solidFill>
+              </a:rPr>
+              <a:t>: </a:t>
+            </a:r>
+            <a:r>
+              <a:rPr lang="en-AU" sz="1600" dirty="0" err="1">
+                <a:solidFill>
+                  <a:schemeClr val="tx1"/>
+                </a:solidFill>
+              </a:rPr>
+              <a:t>noteEventType.AddNote.rawValue</a:t>
+            </a:r>
+            <a:r>
+              <a:rPr lang="en-AU" sz="1600" dirty="0">
+                <a:solidFill>
+                  <a:schemeClr val="tx1"/>
+                </a:solidFill>
+              </a:rPr>
+              <a:t>) </a:t>
+            </a:r>
+          </a:p>
+          <a:p>
+            <a:pPr algn="l"/>
+            <a:endParaRPr lang="en-AU" sz="1600" dirty="0">
+              <a:solidFill>
+                <a:schemeClr val="tx1"/>
+              </a:solidFill>
+            </a:endParaRPr>
+          </a:p>
+          <a:p>
+            <a:pPr algn="l"/>
+            <a:r>
+              <a:rPr lang="en-AU" sz="1600" dirty="0">
+                <a:solidFill>
+                  <a:schemeClr val="tx1"/>
+                </a:solidFill>
+              </a:rPr>
+              <a:t>// send delete note event</a:t>
+            </a:r>
+          </a:p>
+          <a:p>
+            <a:pPr algn="l"/>
+            <a:endParaRPr lang="en-AU" sz="1600" dirty="0">
+              <a:solidFill>
+                <a:schemeClr val="tx1"/>
+              </a:solidFill>
+            </a:endParaRPr>
+          </a:p>
+          <a:p>
+            <a:pPr algn="l"/>
+            <a:r>
+              <a:rPr lang="en-AU" sz="1600" dirty="0" err="1">
+                <a:solidFill>
+                  <a:schemeClr val="tx1"/>
+                </a:solidFill>
+              </a:rPr>
+              <a:t>sendNoteEvent</a:t>
+            </a:r>
+            <a:r>
+              <a:rPr lang="en-AU" sz="1600" dirty="0">
+                <a:solidFill>
+                  <a:schemeClr val="tx1"/>
+                </a:solidFill>
+              </a:rPr>
+              <a:t>(</a:t>
+            </a:r>
+            <a:r>
+              <a:rPr lang="en-AU" sz="1600" dirty="0" err="1">
+                <a:solidFill>
+                  <a:schemeClr val="tx1"/>
+                </a:solidFill>
+              </a:rPr>
+              <a:t>noteId</a:t>
+            </a:r>
+            <a:r>
+              <a:rPr lang="en-AU" sz="1600" dirty="0">
+                <a:solidFill>
+                  <a:schemeClr val="tx1"/>
+                </a:solidFill>
+              </a:rPr>
+              <a:t>: </a:t>
+            </a:r>
+            <a:r>
+              <a:rPr lang="en-AU" sz="1600" dirty="0" err="1">
+                <a:solidFill>
+                  <a:schemeClr val="tx1"/>
+                </a:solidFill>
+              </a:rPr>
+              <a:t>newNoteId</a:t>
+            </a:r>
+            <a:r>
+              <a:rPr lang="en-AU" sz="1600" dirty="0">
+                <a:solidFill>
+                  <a:schemeClr val="tx1"/>
+                </a:solidFill>
+              </a:rPr>
+              <a:t>, </a:t>
+            </a:r>
+            <a:r>
+              <a:rPr lang="en-AU" sz="1600" dirty="0" err="1">
+                <a:solidFill>
+                  <a:schemeClr val="tx1"/>
+                </a:solidFill>
+              </a:rPr>
+              <a:t>eventType</a:t>
+            </a:r>
+            <a:r>
+              <a:rPr lang="en-AU" sz="1600" dirty="0">
+                <a:solidFill>
+                  <a:schemeClr val="tx1"/>
+                </a:solidFill>
+              </a:rPr>
+              <a:t>: </a:t>
+            </a:r>
+            <a:r>
+              <a:rPr lang="en-AU" sz="1600" dirty="0" err="1">
+                <a:solidFill>
+                  <a:schemeClr val="tx1"/>
+                </a:solidFill>
+              </a:rPr>
+              <a:t>noteEventType.DeleteNote.rawValue</a:t>
+            </a:r>
+            <a:r>
+              <a:rPr lang="en-AU" sz="1600" dirty="0">
+                <a:solidFill>
+                  <a:schemeClr val="tx1"/>
+                </a:solidFill>
+              </a:rPr>
+              <a:t>) </a:t>
+            </a:r>
+          </a:p>
+          <a:p>
+            <a:pPr algn="l"/>
+            <a:endParaRPr lang="en-AU" sz="1600" dirty="0">
+              <a:solidFill>
+                <a:schemeClr val="tx1"/>
+              </a:solidFill>
+            </a:endParaRPr>
+          </a:p>
+        </p:txBody>
+      </p:sp>
+    </p:spTree>
+    <p:extLst>
+      <p:ext uri="{BB962C8B-B14F-4D97-AF65-F5344CB8AC3E}">
+        <p14:creationId xmlns:p14="http://schemas.microsoft.com/office/powerpoint/2010/main" val="1564198555"/>
+      </p:ext>
+    </p:extLst>
+  </p:cSld>
+  <p:clrMapOvr>
+    <a:masterClrMapping/>
+  </p:clrMapOvr>
+</p:sld>
+</file>
+
+<file path=ppt/slides/slide11.xml><?xml version="1.0" encoding="utf-8"?>
+<p:sld xmlns:a="http://schemas.openxmlformats.org/drawingml/2006/main" xmlns:r="http://schemas.openxmlformats.org/officeDocument/2006/relationships" xmlns:p="http://schemas.openxmlformats.org/presentationml/2006/main">
+  <p:cSld>
+    <p:spTree>
+      <p:nvGrpSpPr>
+        <p:cNvPr id="1" name=""/>
+        <p:cNvGrpSpPr/>
+        <p:nvPr/>
+      </p:nvGrpSpPr>
+      <p:grpSpPr>
+        <a:xfrm>
+          <a:off x="0" y="0"/>
+          <a:ext cx="0" cy="0"/>
+          <a:chOff x="0" y="0"/>
+          <a:chExt cx="0" cy="0"/>
+        </a:xfrm>
+      </p:grpSpPr>
+      <p:sp>
+        <p:nvSpPr>
+          <p:cNvPr id="2" name="Title 1">
+            <a:extLst>
+              <a:ext uri="{FF2B5EF4-FFF2-40B4-BE49-F238E27FC236}">
+                <a16:creationId xmlns:a16="http://schemas.microsoft.com/office/drawing/2014/main" id="{6E6C3106-75CE-2444-A152-F4B23594B758}"/>
+              </a:ext>
+            </a:extLst>
+          </p:cNvPr>
+          <p:cNvSpPr>
+            <a:spLocks noGrp="1"/>
+          </p:cNvSpPr>
+          <p:nvPr>
+            <p:ph type="title"/>
+          </p:nvPr>
+        </p:nvSpPr>
+        <p:spPr/>
+        <p:txBody>
+          <a:bodyPr/>
+          <a:lstStyle/>
+          <a:p>
+            <a:r>
+              <a:rPr lang="en-US" dirty="0"/>
+              <a:t>Tracking events in Pinpoint</a:t>
+            </a:r>
+          </a:p>
+        </p:txBody>
+      </p:sp>
+      <p:pic>
+        <p:nvPicPr>
+          <p:cNvPr id="7" name="Content Placeholder 6">
+            <a:extLst>
+              <a:ext uri="{FF2B5EF4-FFF2-40B4-BE49-F238E27FC236}">
+                <a16:creationId xmlns:a16="http://schemas.microsoft.com/office/drawing/2014/main" id="{63DD23CE-56BB-B748-8EB5-B3B4A00BAEBE}"/>
+              </a:ext>
+            </a:extLst>
+          </p:cNvPr>
+          <p:cNvPicPr>
+            <a:picLocks noGrp="1" noChangeAspect="1"/>
+          </p:cNvPicPr>
+          <p:nvPr>
+            <p:ph idx="1"/>
+          </p:nvPr>
+        </p:nvPicPr>
+        <p:blipFill>
+          <a:blip r:embed="rId3">
+            <a:extLst>
+              <a:ext uri="{28A0092B-C50C-407E-A947-70E740481C1C}">
+                <a14:useLocalDpi xmlns:a14="http://schemas.microsoft.com/office/drawing/2010/main" val="0"/>
+              </a:ext>
+            </a:extLst>
+          </a:blip>
+          <a:stretch>
+            <a:fillRect/>
+          </a:stretch>
+        </p:blipFill>
+        <p:spPr>
+          <a:xfrm>
+            <a:off x="1429253" y="1482725"/>
+            <a:ext cx="9126939" cy="5238750"/>
+          </a:xfrm>
+        </p:spPr>
+      </p:pic>
+      <p:sp>
+        <p:nvSpPr>
+          <p:cNvPr id="4" name="Footer Placeholder 3">
+            <a:extLst>
+              <a:ext uri="{FF2B5EF4-FFF2-40B4-BE49-F238E27FC236}">
+                <a16:creationId xmlns:a16="http://schemas.microsoft.com/office/drawing/2014/main" id="{E8BC6FD3-C7A2-3D4F-B63A-7BBF72C7FA58}"/>
+              </a:ext>
+            </a:extLst>
+          </p:cNvPr>
+          <p:cNvSpPr>
+            <a:spLocks noGrp="1"/>
+          </p:cNvSpPr>
+          <p:nvPr>
+            <p:ph type="ftr" sz="quarter" idx="11"/>
+          </p:nvPr>
+        </p:nvSpPr>
+        <p:spPr/>
+        <p:txBody>
+          <a:bodyPr/>
+          <a:lstStyle/>
+          <a:p>
+            <a:endParaRPr lang="en-GB" dirty="0"/>
+          </a:p>
+        </p:txBody>
+      </p:sp>
+    </p:spTree>
+    <p:extLst>
+      <p:ext uri="{BB962C8B-B14F-4D97-AF65-F5344CB8AC3E}">
+        <p14:creationId xmlns:p14="http://schemas.microsoft.com/office/powerpoint/2010/main" val="2221828129"/>
+      </p:ext>
+    </p:extLst>
+  </p:cSld>
+  <p:clrMapOvr>
+    <a:masterClrMapping/>
+  </p:clrMapOvr>
+</p:sld>
+</file>
+
+<file path=ppt/slides/slide12.xml><?xml version="1.0" encoding="utf-8"?>
+<p:sld xmlns:a="http://schemas.openxmlformats.org/drawingml/2006/main" xmlns:r="http://schemas.openxmlformats.org/officeDocument/2006/relationships" xmlns:p="http://schemas.openxmlformats.org/presentationml/2006/main">
+  <p:cSld>
+    <p:spTree>
+      <p:nvGrpSpPr>
+        <p:cNvPr id="1" name=""/>
+        <p:cNvGrpSpPr/>
+        <p:nvPr/>
+      </p:nvGrpSpPr>
+      <p:grpSpPr>
+        <a:xfrm>
+          <a:off x="0" y="0"/>
+          <a:ext cx="0" cy="0"/>
+          <a:chOff x="0" y="0"/>
+          <a:chExt cx="0" cy="0"/>
+        </a:xfrm>
+      </p:grpSpPr>
+      <p:sp>
+        <p:nvSpPr>
+          <p:cNvPr id="2" name="Title 1">
+            <a:extLst>
+              <a:ext uri="{FF2B5EF4-FFF2-40B4-BE49-F238E27FC236}">
+                <a16:creationId xmlns:a16="http://schemas.microsoft.com/office/drawing/2014/main" id="{6E6C3106-75CE-2444-A152-F4B23594B758}"/>
+              </a:ext>
+            </a:extLst>
+          </p:cNvPr>
+          <p:cNvSpPr>
+            <a:spLocks noGrp="1"/>
+          </p:cNvSpPr>
+          <p:nvPr>
+            <p:ph type="title"/>
+          </p:nvPr>
+        </p:nvSpPr>
+        <p:spPr/>
+        <p:txBody>
+          <a:bodyPr/>
+          <a:lstStyle/>
+          <a:p>
+            <a:r>
+              <a:rPr lang="en-US" dirty="0"/>
+              <a:t>Other things you can do</a:t>
+            </a:r>
+          </a:p>
+        </p:txBody>
+      </p:sp>
+      <p:sp>
+        <p:nvSpPr>
+          <p:cNvPr id="4" name="Footer Placeholder 3">
+            <a:extLst>
+              <a:ext uri="{FF2B5EF4-FFF2-40B4-BE49-F238E27FC236}">
+                <a16:creationId xmlns:a16="http://schemas.microsoft.com/office/drawing/2014/main" id="{E8BC6FD3-C7A2-3D4F-B63A-7BBF72C7FA58}"/>
+              </a:ext>
+            </a:extLst>
+          </p:cNvPr>
+          <p:cNvSpPr>
+            <a:spLocks noGrp="1"/>
+          </p:cNvSpPr>
+          <p:nvPr>
+            <p:ph type="ftr" sz="quarter" idx="11"/>
+          </p:nvPr>
+        </p:nvSpPr>
+        <p:spPr/>
+        <p:txBody>
+          <a:bodyPr/>
+          <a:lstStyle/>
+          <a:p>
+            <a:endParaRPr lang="en-GB" dirty="0"/>
+          </a:p>
+        </p:txBody>
+      </p:sp>
+      <p:sp>
+        <p:nvSpPr>
+          <p:cNvPr id="5" name="Content Placeholder 4">
+            <a:extLst>
+              <a:ext uri="{FF2B5EF4-FFF2-40B4-BE49-F238E27FC236}">
+                <a16:creationId xmlns:a16="http://schemas.microsoft.com/office/drawing/2014/main" id="{E476D087-EC71-324D-A51A-2584F4073E79}"/>
+              </a:ext>
+            </a:extLst>
+          </p:cNvPr>
+          <p:cNvSpPr>
+            <a:spLocks noGrp="1"/>
+          </p:cNvSpPr>
+          <p:nvPr>
+            <p:ph idx="1"/>
+          </p:nvPr>
+        </p:nvSpPr>
+        <p:spPr/>
+        <p:txBody>
+          <a:bodyPr/>
+          <a:lstStyle/>
+          <a:p>
+            <a:r>
+              <a:rPr lang="en-US" dirty="0"/>
+              <a:t>Funnels</a:t>
+            </a:r>
+          </a:p>
+          <a:p>
+            <a:pPr lvl="1"/>
+            <a:r>
+              <a:rPr lang="en-US" dirty="0"/>
+              <a:t>Allows you to track how many users complete a certain series of events</a:t>
+            </a:r>
+          </a:p>
+          <a:p>
+            <a:r>
+              <a:rPr lang="en-US" dirty="0"/>
+              <a:t>Revenue</a:t>
+            </a:r>
+          </a:p>
+          <a:p>
+            <a:pPr lvl="1"/>
+            <a:r>
+              <a:rPr lang="en-US" dirty="0"/>
+              <a:t>Summary of “monetization events” app sends</a:t>
+            </a:r>
+          </a:p>
+          <a:p>
+            <a:r>
+              <a:rPr lang="en-US" dirty="0"/>
+              <a:t>Demographics</a:t>
+            </a:r>
+          </a:p>
+          <a:p>
+            <a:pPr lvl="1"/>
+            <a:r>
+              <a:rPr lang="en-US" dirty="0"/>
+              <a:t>Details of the platforms, phones, OSs </a:t>
+            </a:r>
+            <a:r>
+              <a:rPr lang="en-US" dirty="0" err="1"/>
+              <a:t>etc</a:t>
+            </a:r>
+            <a:endParaRPr lang="en-US" dirty="0"/>
+          </a:p>
+        </p:txBody>
+      </p:sp>
+    </p:spTree>
+    <p:extLst>
+      <p:ext uri="{BB962C8B-B14F-4D97-AF65-F5344CB8AC3E}">
+        <p14:creationId xmlns:p14="http://schemas.microsoft.com/office/powerpoint/2010/main" val="4087075561"/>
+      </p:ext>
+    </p:extLst>
+  </p:cSld>
+  <p:clrMapOvr>
+    <a:masterClrMapping/>
+  </p:clrMapOvr>
+</p:sld>
+</file>
+
+<file path=ppt/slides/slide13.xml><?xml version="1.0" encoding="utf-8"?>
+<p:sld xmlns:a="http://schemas.openxmlformats.org/drawingml/2006/main" xmlns:r="http://schemas.openxmlformats.org/officeDocument/2006/relationships" xmlns:p="http://schemas.openxmlformats.org/presentationml/2006/main">
+  <p:cSld>
     <p:bg>
       <p:bgPr>
         <a:solidFill>
@@ -6409,7 +7381,7 @@
 </p:sld>
 </file>
 
-<file path=ppt/slides/slide11.xml><?xml version="1.0" encoding="utf-8"?>
+<file path=ppt/slides/slide14.xml><?xml version="1.0" encoding="utf-8"?>
 <p:sld xmlns:a="http://schemas.openxmlformats.org/drawingml/2006/main" xmlns:r="http://schemas.openxmlformats.org/officeDocument/2006/relationships" xmlns:p="http://schemas.openxmlformats.org/presentationml/2006/main">
   <p:cSld>
     <p:spTree>
@@ -6945,7 +7917,7 @@
 </p:sld>
 </file>
 
-<file path=ppt/slides/slide12.xml><?xml version="1.0" encoding="utf-8"?>
+<file path=ppt/slides/slide15.xml><?xml version="1.0" encoding="utf-8"?>
 <p:sld xmlns:a="http://schemas.openxmlformats.org/drawingml/2006/main" xmlns:r="http://schemas.openxmlformats.org/officeDocument/2006/relationships" xmlns:p="http://schemas.openxmlformats.org/presentationml/2006/main">
   <p:cSld>
     <p:spTree>
@@ -7343,7 +8315,7 @@
 </p:sld>
 </file>
 
-<file path=ppt/slides/slide13.xml><?xml version="1.0" encoding="utf-8"?>
+<file path=ppt/slides/slide16.xml><?xml version="1.0" encoding="utf-8"?>
 <p:sld xmlns:a="http://schemas.openxmlformats.org/drawingml/2006/main" xmlns:r="http://schemas.openxmlformats.org/officeDocument/2006/relationships" xmlns:p="http://schemas.openxmlformats.org/presentationml/2006/main">
   <p:cSld>
     <p:bg>
@@ -7678,7 +8650,7 @@
                 <a:latin typeface="+mn-lt"/>
               </a:rPr>
               <a:pPr/>
-              <a:t>13</a:t>
+              <a:t>16</a:t>
             </a:fld>
             <a:endParaRPr lang="en-US">
               <a:solidFill>
@@ -7702,9 +8674,17 @@
 </p:sld>
 </file>
 
-<file path=ppt/slides/slide14.xml><?xml version="1.0" encoding="utf-8"?>
+<file path=ppt/slides/slide17.xml><?xml version="1.0" encoding="utf-8"?>
 <p:sld xmlns:a="http://schemas.openxmlformats.org/drawingml/2006/main" xmlns:r="http://schemas.openxmlformats.org/officeDocument/2006/relationships" xmlns:p="http://schemas.openxmlformats.org/presentationml/2006/main">
   <p:cSld>
+    <p:bg>
+      <p:bgPr>
+        <a:solidFill>
+          <a:schemeClr val="bg1"/>
+        </a:solidFill>
+        <a:effectLst/>
+      </p:bgPr>
+    </p:bg>
     <p:spTree>
       <p:nvGrpSpPr>
         <p:cNvPr id="1" name=""/>
@@ -7719,6 +8699,196 @@
           <a:chExt cx="0" cy="0"/>
         </a:xfrm>
       </p:grpSpPr>
+      <p:sp useBgFill="1">
+        <p:nvSpPr>
+          <p:cNvPr id="10" name="Rectangle 9">
+            <a:extLst>
+              <a:ext uri="{FF2B5EF4-FFF2-40B4-BE49-F238E27FC236}">
+                <a16:creationId xmlns:a16="http://schemas.microsoft.com/office/drawing/2014/main" id="{3B854194-185D-494D-905C-7C7CB2E30F6E}"/>
+              </a:ext>
+              <a:ext uri="{C183D7F6-B498-43B3-948B-1728B52AA6E4}">
+                <adec:decorative xmlns:adec="http://schemas.microsoft.com/office/drawing/2017/decorative" val="1"/>
+              </a:ext>
+            </a:extLst>
+          </p:cNvPr>
+          <p:cNvSpPr>
+            <a:spLocks noGrp="1" noRot="1" noChangeAspect="1" noMove="1" noResize="1" noEditPoints="1" noAdjustHandles="1" noChangeArrowheads="1" noChangeShapeType="1" noTextEdit="1"/>
+          </p:cNvSpPr>
+          <p:nvPr>
+            <p:extLst>
+              <p:ext uri="{386F3935-93C4-4BCD-93E2-E3B085C9AB24}">
+                <p16:designElem xmlns:p16="http://schemas.microsoft.com/office/powerpoint/2015/main" val="1"/>
+              </p:ext>
+            </p:extLst>
+          </p:nvPr>
+        </p:nvSpPr>
+        <p:spPr>
+          <a:xfrm>
+            <a:off x="1" y="0"/>
+            <a:ext cx="6082110" cy="6858000"/>
+          </a:xfrm>
+          <a:prstGeom prst="rect">
+            <a:avLst/>
+          </a:prstGeom>
+          <a:ln>
+            <a:noFill/>
+          </a:ln>
+        </p:spPr>
+        <p:style>
+          <a:lnRef idx="2">
+            <a:schemeClr val="accent1">
+              <a:shade val="50000"/>
+            </a:schemeClr>
+          </a:lnRef>
+          <a:fillRef idx="1">
+            <a:schemeClr val="accent1"/>
+          </a:fillRef>
+          <a:effectRef idx="0">
+            <a:schemeClr val="accent1"/>
+          </a:effectRef>
+          <a:fontRef idx="minor">
+            <a:schemeClr val="lt1"/>
+          </a:fontRef>
+        </p:style>
+        <p:txBody>
+          <a:bodyPr rtlCol="0" anchor="ctr"/>
+          <a:lstStyle/>
+          <a:p>
+            <a:pPr algn="ctr"/>
+            <a:endParaRPr lang="en-US"/>
+          </a:p>
+        </p:txBody>
+      </p:sp>
+      <p:sp>
+        <p:nvSpPr>
+          <p:cNvPr id="12" name="Rectangle 11">
+            <a:extLst>
+              <a:ext uri="{FF2B5EF4-FFF2-40B4-BE49-F238E27FC236}">
+                <a16:creationId xmlns:a16="http://schemas.microsoft.com/office/drawing/2014/main" id="{B4F5FA0D-0104-4987-8241-EFF7C85B88DE}"/>
+              </a:ext>
+              <a:ext uri="{C183D7F6-B498-43B3-948B-1728B52AA6E4}">
+                <adec:decorative xmlns:adec="http://schemas.microsoft.com/office/drawing/2017/decorative" val="1"/>
+              </a:ext>
+            </a:extLst>
+          </p:cNvPr>
+          <p:cNvSpPr>
+            <a:spLocks noGrp="1" noRot="1" noChangeAspect="1" noMove="1" noResize="1" noEditPoints="1" noAdjustHandles="1" noChangeArrowheads="1" noChangeShapeType="1" noTextEdit="1"/>
+          </p:cNvSpPr>
+          <p:nvPr>
+            <p:extLst>
+              <p:ext uri="{386F3935-93C4-4BCD-93E2-E3B085C9AB24}">
+                <p16:designElem xmlns:p16="http://schemas.microsoft.com/office/powerpoint/2015/main" val="1"/>
+              </p:ext>
+            </p:extLst>
+          </p:nvPr>
+        </p:nvSpPr>
+        <p:spPr>
+          <a:xfrm>
+            <a:off x="1" y="0"/>
+            <a:ext cx="12191998" cy="6858000"/>
+          </a:xfrm>
+          <a:prstGeom prst="rect">
+            <a:avLst/>
+          </a:prstGeom>
+          <a:gradFill>
+            <a:gsLst>
+              <a:gs pos="0">
+                <a:schemeClr val="accent1">
+                  <a:lumMod val="90000"/>
+                </a:schemeClr>
+              </a:gs>
+              <a:gs pos="25000">
+                <a:schemeClr val="accent1">
+                  <a:lumMod val="90000"/>
+                </a:schemeClr>
+              </a:gs>
+              <a:gs pos="94000">
+                <a:schemeClr val="bg2">
+                  <a:lumMod val="25000"/>
+                </a:schemeClr>
+              </a:gs>
+              <a:gs pos="100000">
+                <a:schemeClr val="bg2">
+                  <a:lumMod val="25000"/>
+                </a:schemeClr>
+              </a:gs>
+            </a:gsLst>
+            <a:lin ang="4200000" scaled="0"/>
+          </a:gradFill>
+          <a:ln>
+            <a:noFill/>
+          </a:ln>
+        </p:spPr>
+        <p:style>
+          <a:lnRef idx="2">
+            <a:schemeClr val="accent1">
+              <a:shade val="50000"/>
+            </a:schemeClr>
+          </a:lnRef>
+          <a:fillRef idx="1">
+            <a:schemeClr val="accent1"/>
+          </a:fillRef>
+          <a:effectRef idx="0">
+            <a:schemeClr val="accent1"/>
+          </a:effectRef>
+          <a:fontRef idx="minor">
+            <a:schemeClr val="lt1"/>
+          </a:fontRef>
+        </p:style>
+        <p:txBody>
+          <a:bodyPr rtlCol="0" anchor="ctr"/>
+          <a:lstStyle/>
+          <a:p>
+            <a:pPr algn="ctr"/>
+            <a:endParaRPr lang="en-US"/>
+          </a:p>
+        </p:txBody>
+      </p:sp>
+      <p:pic>
+        <p:nvPicPr>
+          <p:cNvPr id="14" name="Picture 13">
+            <a:extLst>
+              <a:ext uri="{FF2B5EF4-FFF2-40B4-BE49-F238E27FC236}">
+                <a16:creationId xmlns:a16="http://schemas.microsoft.com/office/drawing/2014/main" id="{2897127E-6CEF-446C-BE87-93B7C46E49D1}"/>
+              </a:ext>
+              <a:ext uri="{C183D7F6-B498-43B3-948B-1728B52AA6E4}">
+                <adec:decorative xmlns:adec="http://schemas.microsoft.com/office/drawing/2017/decorative" val="1"/>
+              </a:ext>
+            </a:extLst>
+          </p:cNvPr>
+          <p:cNvPicPr>
+            <a:picLocks noGrp="1" noRot="1" noChangeAspect="1" noMove="1" noResize="1" noEditPoints="1" noAdjustHandles="1" noChangeArrowheads="1" noChangeShapeType="1" noCrop="1"/>
+          </p:cNvPicPr>
+          <p:nvPr>
+            <p:extLst>
+              <p:ext uri="{386F3935-93C4-4BCD-93E2-E3B085C9AB24}">
+                <p16:designElem xmlns:p16="http://schemas.microsoft.com/office/powerpoint/2015/main" val="1"/>
+              </p:ext>
+            </p:extLst>
+          </p:nvPr>
+        </p:nvPicPr>
+        <p:blipFill>
+          <a:blip r:embed="rId3">
+            <a:extLst>
+              <a:ext uri="{28A0092B-C50C-407E-A947-70E740481C1C}">
+                <a14:useLocalDpi xmlns:a14="http://schemas.microsoft.com/office/drawing/2010/main" val="0"/>
+              </a:ext>
+            </a:extLst>
+          </a:blip>
+          <a:stretch>
+            <a:fillRect/>
+          </a:stretch>
+        </p:blipFill>
+        <p:spPr>
+          <a:xfrm>
+            <a:off x="0" y="0"/>
+            <a:ext cx="12192000" cy="6858000"/>
+          </a:xfrm>
+          <a:prstGeom prst="rect">
+            <a:avLst/>
+          </a:prstGeom>
+        </p:spPr>
+      </p:pic>
       <p:sp>
         <p:nvSpPr>
           <p:cNvPr id="2" name="Title 1">
@@ -7735,20 +8905,26 @@
             <p:ph type="title"/>
           </p:nvPr>
         </p:nvSpPr>
-        <p:spPr/>
-        <p:txBody>
-          <a:bodyPr/>
-          <a:lstStyle/>
-          <a:p>
-            <a:r>
-              <a:rPr lang="en-US" dirty="0"/>
-              <a:t>AWS </a:t>
-            </a:r>
-            <a:r>
-              <a:rPr lang="en-US" dirty="0" err="1"/>
-              <a:t>Cognito</a:t>
-            </a:r>
-            <a:endParaRPr lang="en-US" dirty="0"/>
+        <p:spPr>
+          <a:xfrm>
+            <a:off x="640079" y="2053641"/>
+            <a:ext cx="3669161" cy="2760098"/>
+          </a:xfrm>
+        </p:spPr>
+        <p:txBody>
+          <a:bodyPr>
+            <a:normAutofit/>
+          </a:bodyPr>
+          <a:lstStyle/>
+          <a:p>
+            <a:r>
+              <a:rPr lang="en-US">
+                <a:solidFill>
+                  <a:srgbClr val="FFFFFF"/>
+                </a:solidFill>
+              </a:rPr>
+              <a:t>AWS Cognito</a:t>
+            </a:r>
           </a:p>
         </p:txBody>
       </p:sp>
@@ -7768,58 +8944,85 @@
             <p:ph idx="1"/>
           </p:nvPr>
         </p:nvSpPr>
-        <p:spPr/>
-        <p:txBody>
-          <a:bodyPr/>
-          <a:lstStyle/>
-          <a:p>
-            <a:r>
-              <a:rPr lang="en-US" dirty="0"/>
+        <p:spPr>
+          <a:xfrm>
+            <a:off x="6090574" y="801866"/>
+            <a:ext cx="5306084" cy="5230634"/>
+          </a:xfrm>
+        </p:spPr>
+        <p:txBody>
+          <a:bodyPr anchor="ctr">
+            <a:normAutofit/>
+          </a:bodyPr>
+          <a:lstStyle/>
+          <a:p>
+            <a:r>
+              <a:rPr lang="en-US" sz="2200">
+                <a:solidFill>
+                  <a:srgbClr val="000000"/>
+                </a:solidFill>
+              </a:rPr>
               <a:t>User Pools allow you to manage user account lifecycle</a:t>
             </a:r>
           </a:p>
           <a:p>
             <a:r>
-              <a:rPr lang="en-US" dirty="0"/>
+              <a:rPr lang="en-US" sz="2200">
+                <a:solidFill>
+                  <a:srgbClr val="000000"/>
+                </a:solidFill>
+              </a:rPr>
               <a:t>Provides configuration and UI for mobile and web apps</a:t>
             </a:r>
           </a:p>
           <a:p>
             <a:r>
-              <a:rPr lang="en-US" dirty="0"/>
+              <a:rPr lang="en-US" sz="2200">
+                <a:solidFill>
+                  <a:srgbClr val="000000"/>
+                </a:solidFill>
+              </a:rPr>
               <a:t>Uses an Identity Pool to associate identities and roles with a user giving them access to certain resources</a:t>
             </a:r>
           </a:p>
           <a:p>
             <a:pPr lvl="1"/>
             <a:r>
-              <a:rPr lang="en-US" dirty="0"/>
+              <a:rPr lang="en-US" sz="2200">
+                <a:solidFill>
+                  <a:srgbClr val="000000"/>
+                </a:solidFill>
+              </a:rPr>
               <a:t>Can set this up for Unauthenticated as well as Authenticated users</a:t>
             </a:r>
           </a:p>
           <a:p>
             <a:r>
-              <a:rPr lang="en-US" dirty="0"/>
+              <a:rPr lang="en-US" sz="2200">
+                <a:solidFill>
+                  <a:srgbClr val="000000"/>
+                </a:solidFill>
+              </a:rPr>
               <a:t>Can monitor logins and other attributes of users</a:t>
             </a:r>
           </a:p>
           <a:p>
             <a:r>
-              <a:rPr lang="en-US" dirty="0"/>
-              <a:t>Alternatives to AWS </a:t>
-            </a:r>
-            <a:r>
-              <a:rPr lang="en-US" dirty="0" err="1"/>
-              <a:t>Cognito</a:t>
-            </a:r>
-            <a:r>
-              <a:rPr lang="en-US" dirty="0"/>
-              <a:t> are managing user authentication through application</a:t>
-            </a:r>
-          </a:p>
-          <a:p>
-            <a:r>
-              <a:rPr lang="en-US" dirty="0"/>
+              <a:rPr lang="en-US" sz="2200">
+                <a:solidFill>
+                  <a:srgbClr val="000000"/>
+                </a:solidFill>
+              </a:rPr>
+              <a:t>Alternatives to AWS Cognito are managing user authentication through application</a:t>
+            </a:r>
+          </a:p>
+          <a:p>
+            <a:r>
+              <a:rPr lang="en-US" sz="2200">
+                <a:solidFill>
+                  <a:srgbClr val="000000"/>
+                </a:solidFill>
+              </a:rPr>
               <a:t>Gives single sign on capabilities</a:t>
             </a:r>
           </a:p>
@@ -7841,12 +9044,24 @@
             <p:ph type="ftr" sz="quarter" idx="11"/>
           </p:nvPr>
         </p:nvSpPr>
-        <p:spPr/>
-        <p:txBody>
-          <a:bodyPr/>
-          <a:lstStyle/>
-          <a:p>
-            <a:endParaRPr lang="en-GB" dirty="0"/>
+        <p:spPr>
+          <a:xfrm>
+            <a:off x="5536367" y="6223702"/>
+            <a:ext cx="5289562" cy="314067"/>
+          </a:xfrm>
+        </p:spPr>
+        <p:txBody>
+          <a:bodyPr>
+            <a:normAutofit/>
+          </a:bodyPr>
+          <a:lstStyle/>
+          <a:p>
+            <a:pPr algn="r"/>
+            <a:endParaRPr lang="en-GB" sz="1000">
+              <a:solidFill>
+                <a:srgbClr val="898989"/>
+              </a:solidFill>
+            </a:endParaRPr>
           </a:p>
         </p:txBody>
       </p:sp>
@@ -7866,17 +9081,32 @@
             <p:ph type="sldNum" sz="quarter" idx="12"/>
           </p:nvPr>
         </p:nvSpPr>
-        <p:spPr/>
-        <p:txBody>
-          <a:bodyPr/>
+        <p:spPr>
+          <a:xfrm>
+            <a:off x="10825930" y="6223702"/>
+            <a:ext cx="570728" cy="314067"/>
+          </a:xfrm>
+        </p:spPr>
+        <p:txBody>
+          <a:bodyPr>
+            <a:normAutofit/>
+          </a:bodyPr>
           <a:lstStyle/>
           <a:p>
             <a:fld id="{05072F42-4DFA-4725-86F9-7594E4AB4EB5}" type="slidenum">
-              <a:rPr lang="en-GB" smtClean="0"/>
+              <a:rPr lang="en-GB" sz="1000">
+                <a:solidFill>
+                  <a:srgbClr val="898989"/>
+                </a:solidFill>
+              </a:rPr>
               <a:pPr/>
-              <a:t>14</a:t>
+              <a:t>3</a:t>
             </a:fld>
-            <a:endParaRPr lang="en-GB"/>
+            <a:endParaRPr lang="en-GB" sz="1000">
+              <a:solidFill>
+                <a:srgbClr val="898989"/>
+              </a:solidFill>
+            </a:endParaRPr>
           </a:p>
         </p:txBody>
       </p:sp>
@@ -7884,6 +9114,297 @@
     <p:extLst>
       <p:ext uri="{BB962C8B-B14F-4D97-AF65-F5344CB8AC3E}">
         <p14:creationId xmlns:p14="http://schemas.microsoft.com/office/powerpoint/2010/main" val="951674525"/>
+      </p:ext>
+    </p:extLst>
+  </p:cSld>
+  <p:clrMapOvr>
+    <a:masterClrMapping/>
+  </p:clrMapOvr>
+</p:sld>
+</file>
+
+<file path=ppt/slides/slide18.xml><?xml version="1.0" encoding="utf-8"?>
+<p:sld xmlns:a="http://schemas.openxmlformats.org/drawingml/2006/main" xmlns:r="http://schemas.openxmlformats.org/officeDocument/2006/relationships" xmlns:p="http://schemas.openxmlformats.org/presentationml/2006/main">
+  <p:cSld>
+    <p:bg>
+      <p:bgPr>
+        <a:solidFill>
+          <a:schemeClr val="bg1"/>
+        </a:solidFill>
+        <a:effectLst/>
+      </p:bgPr>
+    </p:bg>
+    <p:spTree>
+      <p:nvGrpSpPr>
+        <p:cNvPr id="1" name=""/>
+        <p:cNvGrpSpPr/>
+        <p:nvPr/>
+      </p:nvGrpSpPr>
+      <p:grpSpPr>
+        <a:xfrm>
+          <a:off x="0" y="0"/>
+          <a:ext cx="0" cy="0"/>
+          <a:chOff x="0" y="0"/>
+          <a:chExt cx="0" cy="0"/>
+        </a:xfrm>
+      </p:grpSpPr>
+      <p:sp>
+        <p:nvSpPr>
+          <p:cNvPr id="12" name="Rectangle 11">
+            <a:extLst>
+              <a:ext uri="{FF2B5EF4-FFF2-40B4-BE49-F238E27FC236}">
+                <a16:creationId xmlns:a16="http://schemas.microsoft.com/office/drawing/2014/main" id="{32BC26D8-82FB-445E-AA49-62A77D7C1EE0}"/>
+              </a:ext>
+              <a:ext uri="{C183D7F6-B498-43B3-948B-1728B52AA6E4}">
+                <adec:decorative xmlns:adec="http://schemas.microsoft.com/office/drawing/2017/decorative" val="1"/>
+              </a:ext>
+            </a:extLst>
+          </p:cNvPr>
+          <p:cNvSpPr>
+            <a:spLocks noGrp="1" noRot="1" noChangeAspect="1" noMove="1" noResize="1" noEditPoints="1" noAdjustHandles="1" noChangeArrowheads="1" noChangeShapeType="1" noTextEdit="1"/>
+          </p:cNvSpPr>
+          <p:nvPr>
+            <p:extLst>
+              <p:ext uri="{386F3935-93C4-4BCD-93E2-E3B085C9AB24}">
+                <p16:designElem xmlns:p16="http://schemas.microsoft.com/office/powerpoint/2015/main" val="1"/>
+              </p:ext>
+            </p:extLst>
+          </p:nvPr>
+        </p:nvSpPr>
+        <p:spPr>
+          <a:xfrm>
+            <a:off x="0" y="0"/>
+            <a:ext cx="12192000" cy="6858000"/>
+          </a:xfrm>
+          <a:prstGeom prst="rect">
+            <a:avLst/>
+          </a:prstGeom>
+          <a:solidFill>
+            <a:schemeClr val="tx1">
+              <a:lumMod val="65000"/>
+              <a:lumOff val="35000"/>
+            </a:schemeClr>
+          </a:solidFill>
+          <a:ln>
+            <a:noFill/>
+          </a:ln>
+        </p:spPr>
+        <p:style>
+          <a:lnRef idx="2">
+            <a:schemeClr val="accent1">
+              <a:shade val="50000"/>
+            </a:schemeClr>
+          </a:lnRef>
+          <a:fillRef idx="1">
+            <a:schemeClr val="accent1"/>
+          </a:fillRef>
+          <a:effectRef idx="0">
+            <a:schemeClr val="accent1"/>
+          </a:effectRef>
+          <a:fontRef idx="minor">
+            <a:schemeClr val="lt1"/>
+          </a:fontRef>
+        </p:style>
+        <p:txBody>
+          <a:bodyPr rtlCol="0" anchor="ctr"/>
+          <a:lstStyle/>
+          <a:p>
+            <a:pPr algn="ctr"/>
+            <a:endParaRPr lang="en-US"/>
+          </a:p>
+        </p:txBody>
+      </p:sp>
+      <p:sp>
+        <p:nvSpPr>
+          <p:cNvPr id="14" name="Rectangle 13">
+            <a:extLst>
+              <a:ext uri="{FF2B5EF4-FFF2-40B4-BE49-F238E27FC236}">
+                <a16:creationId xmlns:a16="http://schemas.microsoft.com/office/drawing/2014/main" id="{CB44330D-EA18-4254-AA95-EB49948539B8}"/>
+              </a:ext>
+              <a:ext uri="{C183D7F6-B498-43B3-948B-1728B52AA6E4}">
+                <adec:decorative xmlns:adec="http://schemas.microsoft.com/office/drawing/2017/decorative" val="1"/>
+              </a:ext>
+            </a:extLst>
+          </p:cNvPr>
+          <p:cNvSpPr>
+            <a:spLocks noGrp="1" noRot="1" noChangeAspect="1" noMove="1" noResize="1" noEditPoints="1" noAdjustHandles="1" noChangeArrowheads="1" noChangeShapeType="1" noTextEdit="1"/>
+          </p:cNvSpPr>
+          <p:nvPr>
+            <p:extLst>
+              <p:ext uri="{386F3935-93C4-4BCD-93E2-E3B085C9AB24}">
+                <p16:designElem xmlns:p16="http://schemas.microsoft.com/office/powerpoint/2015/main" val="1"/>
+              </p:ext>
+            </p:extLst>
+          </p:nvPr>
+        </p:nvSpPr>
+        <p:spPr>
+          <a:xfrm>
+            <a:off x="477012" y="480060"/>
+            <a:ext cx="11237976" cy="5897880"/>
+          </a:xfrm>
+          <a:prstGeom prst="rect">
+            <a:avLst/>
+          </a:prstGeom>
+          <a:solidFill>
+            <a:srgbClr val="FFFFFF"/>
+          </a:solidFill>
+          <a:ln>
+            <a:noFill/>
+          </a:ln>
+        </p:spPr>
+        <p:style>
+          <a:lnRef idx="2">
+            <a:schemeClr val="accent1">
+              <a:shade val="50000"/>
+            </a:schemeClr>
+          </a:lnRef>
+          <a:fillRef idx="1">
+            <a:schemeClr val="accent1"/>
+          </a:fillRef>
+          <a:effectRef idx="0">
+            <a:schemeClr val="accent1"/>
+          </a:effectRef>
+          <a:fontRef idx="minor">
+            <a:schemeClr val="lt1"/>
+          </a:fontRef>
+        </p:style>
+        <p:txBody>
+          <a:bodyPr rtlCol="0" anchor="ctr"/>
+          <a:lstStyle/>
+          <a:p>
+            <a:pPr algn="ctr"/>
+            <a:endParaRPr lang="en-US"/>
+          </a:p>
+        </p:txBody>
+      </p:sp>
+      <p:pic>
+        <p:nvPicPr>
+          <p:cNvPr id="7" name="Content Placeholder 6">
+            <a:extLst>
+              <a:ext uri="{FF2B5EF4-FFF2-40B4-BE49-F238E27FC236}">
+                <a16:creationId xmlns:a16="http://schemas.microsoft.com/office/drawing/2014/main" id="{5D8BF68A-7F82-6840-AB46-23305D97A9B0}"/>
+              </a:ext>
+            </a:extLst>
+          </p:cNvPr>
+          <p:cNvPicPr>
+            <a:picLocks noGrp="1" noChangeAspect="1"/>
+          </p:cNvPicPr>
+          <p:nvPr>
+            <p:ph idx="1"/>
+          </p:nvPr>
+        </p:nvPicPr>
+        <p:blipFill>
+          <a:blip r:embed="rId3">
+            <a:extLst>
+              <a:ext uri="{28A0092B-C50C-407E-A947-70E740481C1C}">
+                <a14:useLocalDpi xmlns:a14="http://schemas.microsoft.com/office/drawing/2010/main" val="0"/>
+              </a:ext>
+            </a:extLst>
+          </a:blip>
+          <a:stretch>
+            <a:fillRect/>
+          </a:stretch>
+        </p:blipFill>
+        <p:spPr>
+          <a:xfrm>
+            <a:off x="2769989" y="643467"/>
+            <a:ext cx="6652021" cy="5571066"/>
+          </a:xfrm>
+          <a:prstGeom prst="rect">
+            <a:avLst/>
+          </a:prstGeom>
+        </p:spPr>
+      </p:pic>
+      <p:sp>
+        <p:nvSpPr>
+          <p:cNvPr id="4" name="Footer Placeholder 3">
+            <a:extLst>
+              <a:ext uri="{FF2B5EF4-FFF2-40B4-BE49-F238E27FC236}">
+                <a16:creationId xmlns:a16="http://schemas.microsoft.com/office/drawing/2014/main" id="{DE1AB693-C669-AF40-8A5F-80BA44D95E13}"/>
+              </a:ext>
+            </a:extLst>
+          </p:cNvPr>
+          <p:cNvSpPr>
+            <a:spLocks noGrp="1"/>
+          </p:cNvSpPr>
+          <p:nvPr>
+            <p:ph type="ftr" sz="quarter" idx="11"/>
+          </p:nvPr>
+        </p:nvSpPr>
+        <p:spPr>
+          <a:xfrm>
+            <a:off x="4038600" y="6356350"/>
+            <a:ext cx="4114800" cy="365125"/>
+          </a:xfrm>
+        </p:spPr>
+        <p:txBody>
+          <a:bodyPr vert="horz" lIns="91440" tIns="45720" rIns="91440" bIns="45720" rtlCol="0" anchor="ctr">
+            <a:normAutofit/>
+          </a:bodyPr>
+          <a:lstStyle/>
+          <a:p>
+            <a:endParaRPr lang="en-US" sz="1200" kern="1200">
+              <a:solidFill>
+                <a:srgbClr val="FFFFFF"/>
+              </a:solidFill>
+              <a:latin typeface="+mn-lt"/>
+              <a:ea typeface="+mn-ea"/>
+              <a:cs typeface="+mn-cs"/>
+            </a:endParaRPr>
+          </a:p>
+        </p:txBody>
+      </p:sp>
+      <p:sp>
+        <p:nvSpPr>
+          <p:cNvPr id="5" name="Slide Number Placeholder 4">
+            <a:extLst>
+              <a:ext uri="{FF2B5EF4-FFF2-40B4-BE49-F238E27FC236}">
+                <a16:creationId xmlns:a16="http://schemas.microsoft.com/office/drawing/2014/main" id="{D08969B2-7EB0-5649-8F5A-7D880D334587}"/>
+              </a:ext>
+            </a:extLst>
+          </p:cNvPr>
+          <p:cNvSpPr>
+            <a:spLocks noGrp="1"/>
+          </p:cNvSpPr>
+          <p:nvPr>
+            <p:ph type="sldNum" sz="quarter" idx="12"/>
+          </p:nvPr>
+        </p:nvSpPr>
+        <p:spPr>
+          <a:xfrm>
+            <a:off x="8610600" y="6356350"/>
+            <a:ext cx="2743200" cy="365125"/>
+          </a:xfrm>
+        </p:spPr>
+        <p:txBody>
+          <a:bodyPr vert="horz" lIns="91440" tIns="45720" rIns="91440" bIns="45720" rtlCol="0" anchor="ctr">
+            <a:normAutofit/>
+          </a:bodyPr>
+          <a:lstStyle/>
+          <a:p>
+            <a:fld id="{05072F42-4DFA-4725-86F9-7594E4AB4EB5}" type="slidenum">
+              <a:rPr lang="en-US">
+                <a:solidFill>
+                  <a:srgbClr val="FFFFFF"/>
+                </a:solidFill>
+                <a:latin typeface="+mn-lt"/>
+              </a:rPr>
+              <a:pPr/>
+              <a:t>2</a:t>
+            </a:fld>
+            <a:endParaRPr lang="en-US">
+              <a:solidFill>
+                <a:srgbClr val="FFFFFF"/>
+              </a:solidFill>
+              <a:latin typeface="+mn-lt"/>
+            </a:endParaRPr>
+          </a:p>
+        </p:txBody>
+      </p:sp>
+    </p:spTree>
+    <p:extLst>
+      <p:ext uri="{BB962C8B-B14F-4D97-AF65-F5344CB8AC3E}">
+        <p14:creationId xmlns:p14="http://schemas.microsoft.com/office/powerpoint/2010/main" val="2947697067"/>
       </p:ext>
     </p:extLst>
   </p:cSld>
@@ -8507,6 +10028,561 @@
           <p:cNvPr id="2" name="Title 1">
             <a:extLst>
               <a:ext uri="{FF2B5EF4-FFF2-40B4-BE49-F238E27FC236}">
+                <a16:creationId xmlns:a16="http://schemas.microsoft.com/office/drawing/2014/main" id="{DC2F340D-D8EA-6049-8E80-61EFD6DF6B6A}"/>
+              </a:ext>
+            </a:extLst>
+          </p:cNvPr>
+          <p:cNvSpPr>
+            <a:spLocks noGrp="1"/>
+          </p:cNvSpPr>
+          <p:nvPr>
+            <p:ph type="title"/>
+          </p:nvPr>
+        </p:nvSpPr>
+        <p:spPr/>
+        <p:txBody>
+          <a:bodyPr/>
+          <a:lstStyle/>
+          <a:p>
+            <a:endParaRPr lang="en-US"/>
+          </a:p>
+        </p:txBody>
+      </p:sp>
+      <p:pic>
+        <p:nvPicPr>
+          <p:cNvPr id="7" name="Content Placeholder 6">
+            <a:extLst>
+              <a:ext uri="{FF2B5EF4-FFF2-40B4-BE49-F238E27FC236}">
+                <a16:creationId xmlns:a16="http://schemas.microsoft.com/office/drawing/2014/main" id="{7A2AB00D-A406-1540-B1CE-4400C3FC4DD2}"/>
+              </a:ext>
+            </a:extLst>
+          </p:cNvPr>
+          <p:cNvPicPr>
+            <a:picLocks noGrp="1" noChangeAspect="1"/>
+          </p:cNvPicPr>
+          <p:nvPr>
+            <p:ph idx="1"/>
+          </p:nvPr>
+        </p:nvPicPr>
+        <p:blipFill>
+          <a:blip r:embed="rId3">
+            <a:extLst>
+              <a:ext uri="{28A0092B-C50C-407E-A947-70E740481C1C}">
+                <a14:useLocalDpi xmlns:a14="http://schemas.microsoft.com/office/drawing/2010/main" val="0"/>
+              </a:ext>
+            </a:extLst>
+          </a:blip>
+          <a:stretch>
+            <a:fillRect/>
+          </a:stretch>
+        </p:blipFill>
+        <p:spPr>
+          <a:xfrm>
+            <a:off x="1550745" y="0"/>
+            <a:ext cx="9090509" cy="6746035"/>
+          </a:xfrm>
+        </p:spPr>
+      </p:pic>
+      <p:sp>
+        <p:nvSpPr>
+          <p:cNvPr id="4" name="Footer Placeholder 3">
+            <a:extLst>
+              <a:ext uri="{FF2B5EF4-FFF2-40B4-BE49-F238E27FC236}">
+                <a16:creationId xmlns:a16="http://schemas.microsoft.com/office/drawing/2014/main" id="{071AA134-81B7-CB44-B31F-FA6BC9E7E3ED}"/>
+              </a:ext>
+            </a:extLst>
+          </p:cNvPr>
+          <p:cNvSpPr>
+            <a:spLocks noGrp="1"/>
+          </p:cNvSpPr>
+          <p:nvPr>
+            <p:ph type="ftr" sz="quarter" idx="11"/>
+          </p:nvPr>
+        </p:nvSpPr>
+        <p:spPr/>
+        <p:txBody>
+          <a:bodyPr/>
+          <a:lstStyle/>
+          <a:p>
+            <a:endParaRPr lang="en-GB" dirty="0"/>
+          </a:p>
+        </p:txBody>
+      </p:sp>
+      <p:sp>
+        <p:nvSpPr>
+          <p:cNvPr id="5" name="Slide Number Placeholder 4">
+            <a:extLst>
+              <a:ext uri="{FF2B5EF4-FFF2-40B4-BE49-F238E27FC236}">
+                <a16:creationId xmlns:a16="http://schemas.microsoft.com/office/drawing/2014/main" id="{2376D585-0BC8-EF43-889A-953CD8E2910D}"/>
+              </a:ext>
+            </a:extLst>
+          </p:cNvPr>
+          <p:cNvSpPr>
+            <a:spLocks noGrp="1"/>
+          </p:cNvSpPr>
+          <p:nvPr>
+            <p:ph type="sldNum" sz="quarter" idx="12"/>
+          </p:nvPr>
+        </p:nvSpPr>
+        <p:spPr/>
+        <p:txBody>
+          <a:bodyPr/>
+          <a:lstStyle/>
+          <a:p>
+            <a:fld id="{05072F42-4DFA-4725-86F9-7594E4AB4EB5}" type="slidenum">
+              <a:rPr lang="en-GB" smtClean="0"/>
+              <a:pPr/>
+              <a:t>5</a:t>
+            </a:fld>
+            <a:endParaRPr lang="en-GB"/>
+          </a:p>
+        </p:txBody>
+      </p:sp>
+    </p:spTree>
+    <p:extLst>
+      <p:ext uri="{BB962C8B-B14F-4D97-AF65-F5344CB8AC3E}">
+        <p14:creationId xmlns:p14="http://schemas.microsoft.com/office/powerpoint/2010/main" val="2524633410"/>
+      </p:ext>
+    </p:extLst>
+  </p:cSld>
+  <p:clrMapOvr>
+    <a:masterClrMapping/>
+  </p:clrMapOvr>
+</p:sld>
+</file>
+
+<file path=ppt/slides/slide6.xml><?xml version="1.0" encoding="utf-8"?>
+<p:sld xmlns:a="http://schemas.openxmlformats.org/drawingml/2006/main" xmlns:r="http://schemas.openxmlformats.org/officeDocument/2006/relationships" xmlns:p="http://schemas.openxmlformats.org/presentationml/2006/main">
+  <p:cSld>
+    <p:spTree>
+      <p:nvGrpSpPr>
+        <p:cNvPr id="1" name=""/>
+        <p:cNvGrpSpPr/>
+        <p:nvPr/>
+      </p:nvGrpSpPr>
+      <p:grpSpPr>
+        <a:xfrm>
+          <a:off x="0" y="0"/>
+          <a:ext cx="0" cy="0"/>
+          <a:chOff x="0" y="0"/>
+          <a:chExt cx="0" cy="0"/>
+        </a:xfrm>
+      </p:grpSpPr>
+      <p:sp>
+        <p:nvSpPr>
+          <p:cNvPr id="4" name="Footer Placeholder 3">
+            <a:extLst>
+              <a:ext uri="{FF2B5EF4-FFF2-40B4-BE49-F238E27FC236}">
+                <a16:creationId xmlns:a16="http://schemas.microsoft.com/office/drawing/2014/main" id="{071AA134-81B7-CB44-B31F-FA6BC9E7E3ED}"/>
+              </a:ext>
+            </a:extLst>
+          </p:cNvPr>
+          <p:cNvSpPr>
+            <a:spLocks noGrp="1"/>
+          </p:cNvSpPr>
+          <p:nvPr>
+            <p:ph type="ftr" sz="quarter" idx="11"/>
+          </p:nvPr>
+        </p:nvSpPr>
+        <p:spPr/>
+        <p:txBody>
+          <a:bodyPr/>
+          <a:lstStyle/>
+          <a:p>
+            <a:endParaRPr lang="en-GB" dirty="0"/>
+          </a:p>
+        </p:txBody>
+      </p:sp>
+      <p:sp>
+        <p:nvSpPr>
+          <p:cNvPr id="5" name="Slide Number Placeholder 4">
+            <a:extLst>
+              <a:ext uri="{FF2B5EF4-FFF2-40B4-BE49-F238E27FC236}">
+                <a16:creationId xmlns:a16="http://schemas.microsoft.com/office/drawing/2014/main" id="{2376D585-0BC8-EF43-889A-953CD8E2910D}"/>
+              </a:ext>
+            </a:extLst>
+          </p:cNvPr>
+          <p:cNvSpPr>
+            <a:spLocks noGrp="1"/>
+          </p:cNvSpPr>
+          <p:nvPr>
+            <p:ph type="sldNum" sz="quarter" idx="12"/>
+          </p:nvPr>
+        </p:nvSpPr>
+        <p:spPr/>
+        <p:txBody>
+          <a:bodyPr/>
+          <a:lstStyle/>
+          <a:p>
+            <a:fld id="{05072F42-4DFA-4725-86F9-7594E4AB4EB5}" type="slidenum">
+              <a:rPr lang="en-GB" smtClean="0"/>
+              <a:pPr/>
+              <a:t>6</a:t>
+            </a:fld>
+            <a:endParaRPr lang="en-GB"/>
+          </a:p>
+        </p:txBody>
+      </p:sp>
+      <p:pic>
+        <p:nvPicPr>
+          <p:cNvPr id="11" name="Picture 10">
+            <a:extLst>
+              <a:ext uri="{FF2B5EF4-FFF2-40B4-BE49-F238E27FC236}">
+                <a16:creationId xmlns:a16="http://schemas.microsoft.com/office/drawing/2014/main" id="{DB8F0F87-7E25-774A-84B1-FE726722EE76}"/>
+              </a:ext>
+            </a:extLst>
+          </p:cNvPr>
+          <p:cNvPicPr>
+            <a:picLocks noChangeAspect="1"/>
+          </p:cNvPicPr>
+          <p:nvPr/>
+        </p:nvPicPr>
+        <p:blipFill>
+          <a:blip r:embed="rId3">
+            <a:extLst>
+              <a:ext uri="{28A0092B-C50C-407E-A947-70E740481C1C}">
+                <a14:useLocalDpi xmlns:a14="http://schemas.microsoft.com/office/drawing/2010/main" val="0"/>
+              </a:ext>
+            </a:extLst>
+          </a:blip>
+          <a:stretch>
+            <a:fillRect/>
+          </a:stretch>
+        </p:blipFill>
+        <p:spPr>
+          <a:xfrm>
+            <a:off x="2393950" y="196850"/>
+            <a:ext cx="7404100" cy="6464300"/>
+          </a:xfrm>
+          <a:prstGeom prst="rect">
+            <a:avLst/>
+          </a:prstGeom>
+        </p:spPr>
+      </p:pic>
+    </p:spTree>
+    <p:extLst>
+      <p:ext uri="{BB962C8B-B14F-4D97-AF65-F5344CB8AC3E}">
+        <p14:creationId xmlns:p14="http://schemas.microsoft.com/office/powerpoint/2010/main" val="3074740187"/>
+      </p:ext>
+    </p:extLst>
+  </p:cSld>
+  <p:clrMapOvr>
+    <a:masterClrMapping/>
+  </p:clrMapOvr>
+</p:sld>
+</file>
+
+<file path=ppt/slides/slide7.xml><?xml version="1.0" encoding="utf-8"?>
+<p:sld xmlns:a="http://schemas.openxmlformats.org/drawingml/2006/main" xmlns:r="http://schemas.openxmlformats.org/officeDocument/2006/relationships" xmlns:p="http://schemas.openxmlformats.org/presentationml/2006/main">
+  <p:cSld>
+    <p:bg>
+      <p:bgPr>
+        <a:solidFill>
+          <a:schemeClr val="bg1"/>
+        </a:solidFill>
+        <a:effectLst/>
+      </p:bgPr>
+    </p:bg>
+    <p:spTree>
+      <p:nvGrpSpPr>
+        <p:cNvPr id="1" name=""/>
+        <p:cNvGrpSpPr/>
+        <p:nvPr/>
+      </p:nvGrpSpPr>
+      <p:grpSpPr>
+        <a:xfrm>
+          <a:off x="0" y="0"/>
+          <a:ext cx="0" cy="0"/>
+          <a:chOff x="0" y="0"/>
+          <a:chExt cx="0" cy="0"/>
+        </a:xfrm>
+      </p:grpSpPr>
+      <p:sp>
+        <p:nvSpPr>
+          <p:cNvPr id="10" name="Rectangle 9">
+            <a:extLst>
+              <a:ext uri="{FF2B5EF4-FFF2-40B4-BE49-F238E27FC236}">
+                <a16:creationId xmlns:a16="http://schemas.microsoft.com/office/drawing/2014/main" id="{32BC26D8-82FB-445E-AA49-62A77D7C1EE0}"/>
+              </a:ext>
+              <a:ext uri="{C183D7F6-B498-43B3-948B-1728B52AA6E4}">
+                <adec:decorative xmlns:adec="http://schemas.microsoft.com/office/drawing/2017/decorative" val="1"/>
+              </a:ext>
+            </a:extLst>
+          </p:cNvPr>
+          <p:cNvSpPr>
+            <a:spLocks noGrp="1" noRot="1" noChangeAspect="1" noMove="1" noResize="1" noEditPoints="1" noAdjustHandles="1" noChangeArrowheads="1" noChangeShapeType="1" noTextEdit="1"/>
+          </p:cNvSpPr>
+          <p:nvPr>
+            <p:extLst>
+              <p:ext uri="{386F3935-93C4-4BCD-93E2-E3B085C9AB24}">
+                <p16:designElem xmlns:p16="http://schemas.microsoft.com/office/powerpoint/2015/main" val="1"/>
+              </p:ext>
+            </p:extLst>
+          </p:nvPr>
+        </p:nvSpPr>
+        <p:spPr>
+          <a:xfrm>
+            <a:off x="0" y="0"/>
+            <a:ext cx="12192000" cy="6858000"/>
+          </a:xfrm>
+          <a:prstGeom prst="rect">
+            <a:avLst/>
+          </a:prstGeom>
+          <a:solidFill>
+            <a:schemeClr val="tx1">
+              <a:lumMod val="65000"/>
+              <a:lumOff val="35000"/>
+            </a:schemeClr>
+          </a:solidFill>
+          <a:ln>
+            <a:noFill/>
+          </a:ln>
+        </p:spPr>
+        <p:style>
+          <a:lnRef idx="2">
+            <a:schemeClr val="accent1">
+              <a:shade val="50000"/>
+            </a:schemeClr>
+          </a:lnRef>
+          <a:fillRef idx="1">
+            <a:schemeClr val="accent1"/>
+          </a:fillRef>
+          <a:effectRef idx="0">
+            <a:schemeClr val="accent1"/>
+          </a:effectRef>
+          <a:fontRef idx="minor">
+            <a:schemeClr val="lt1"/>
+          </a:fontRef>
+        </p:style>
+        <p:txBody>
+          <a:bodyPr rtlCol="0" anchor="ctr"/>
+          <a:lstStyle/>
+          <a:p>
+            <a:pPr algn="ctr"/>
+            <a:endParaRPr lang="en-US"/>
+          </a:p>
+        </p:txBody>
+      </p:sp>
+      <p:sp>
+        <p:nvSpPr>
+          <p:cNvPr id="12" name="Rectangle 11">
+            <a:extLst>
+              <a:ext uri="{FF2B5EF4-FFF2-40B4-BE49-F238E27FC236}">
+                <a16:creationId xmlns:a16="http://schemas.microsoft.com/office/drawing/2014/main" id="{CB44330D-EA18-4254-AA95-EB49948539B8}"/>
+              </a:ext>
+              <a:ext uri="{C183D7F6-B498-43B3-948B-1728B52AA6E4}">
+                <adec:decorative xmlns:adec="http://schemas.microsoft.com/office/drawing/2017/decorative" val="1"/>
+              </a:ext>
+            </a:extLst>
+          </p:cNvPr>
+          <p:cNvSpPr>
+            <a:spLocks noGrp="1" noRot="1" noChangeAspect="1" noMove="1" noResize="1" noEditPoints="1" noAdjustHandles="1" noChangeArrowheads="1" noChangeShapeType="1" noTextEdit="1"/>
+          </p:cNvSpPr>
+          <p:nvPr>
+            <p:extLst>
+              <p:ext uri="{386F3935-93C4-4BCD-93E2-E3B085C9AB24}">
+                <p16:designElem xmlns:p16="http://schemas.microsoft.com/office/powerpoint/2015/main" val="1"/>
+              </p:ext>
+            </p:extLst>
+          </p:nvPr>
+        </p:nvSpPr>
+        <p:spPr>
+          <a:xfrm>
+            <a:off x="477012" y="480060"/>
+            <a:ext cx="11237976" cy="5897880"/>
+          </a:xfrm>
+          <a:prstGeom prst="rect">
+            <a:avLst/>
+          </a:prstGeom>
+          <a:solidFill>
+            <a:srgbClr val="FFFFFF"/>
+          </a:solidFill>
+          <a:ln>
+            <a:noFill/>
+          </a:ln>
+        </p:spPr>
+        <p:style>
+          <a:lnRef idx="2">
+            <a:schemeClr val="accent1">
+              <a:shade val="50000"/>
+            </a:schemeClr>
+          </a:lnRef>
+          <a:fillRef idx="1">
+            <a:schemeClr val="accent1"/>
+          </a:fillRef>
+          <a:effectRef idx="0">
+            <a:schemeClr val="accent1"/>
+          </a:effectRef>
+          <a:fontRef idx="minor">
+            <a:schemeClr val="lt1"/>
+          </a:fontRef>
+        </p:style>
+        <p:txBody>
+          <a:bodyPr rtlCol="0" anchor="ctr"/>
+          <a:lstStyle/>
+          <a:p>
+            <a:pPr algn="ctr"/>
+            <a:endParaRPr lang="en-US"/>
+          </a:p>
+        </p:txBody>
+      </p:sp>
+      <p:pic>
+        <p:nvPicPr>
+          <p:cNvPr id="3" name="Picture 2">
+            <a:extLst>
+              <a:ext uri="{FF2B5EF4-FFF2-40B4-BE49-F238E27FC236}">
+                <a16:creationId xmlns:a16="http://schemas.microsoft.com/office/drawing/2014/main" id="{047890D2-E626-9E4E-86BF-3453B38F40E5}"/>
+              </a:ext>
+            </a:extLst>
+          </p:cNvPr>
+          <p:cNvPicPr>
+            <a:picLocks noChangeAspect="1"/>
+          </p:cNvPicPr>
+          <p:nvPr/>
+        </p:nvPicPr>
+        <p:blipFill>
+          <a:blip r:embed="rId3">
+            <a:extLst>
+              <a:ext uri="{28A0092B-C50C-407E-A947-70E740481C1C}">
+                <a14:useLocalDpi xmlns:a14="http://schemas.microsoft.com/office/drawing/2010/main" val="0"/>
+              </a:ext>
+            </a:extLst>
+          </a:blip>
+          <a:stretch>
+            <a:fillRect/>
+          </a:stretch>
+        </p:blipFill>
+        <p:spPr>
+          <a:xfrm>
+            <a:off x="643467" y="1302512"/>
+            <a:ext cx="10905066" cy="4252975"/>
+          </a:xfrm>
+          <a:prstGeom prst="rect">
+            <a:avLst/>
+          </a:prstGeom>
+        </p:spPr>
+      </p:pic>
+      <p:sp>
+        <p:nvSpPr>
+          <p:cNvPr id="4" name="Footer Placeholder 3">
+            <a:extLst>
+              <a:ext uri="{FF2B5EF4-FFF2-40B4-BE49-F238E27FC236}">
+                <a16:creationId xmlns:a16="http://schemas.microsoft.com/office/drawing/2014/main" id="{071AA134-81B7-CB44-B31F-FA6BC9E7E3ED}"/>
+              </a:ext>
+            </a:extLst>
+          </p:cNvPr>
+          <p:cNvSpPr>
+            <a:spLocks noGrp="1"/>
+          </p:cNvSpPr>
+          <p:nvPr>
+            <p:ph type="ftr" sz="quarter" idx="11"/>
+          </p:nvPr>
+        </p:nvSpPr>
+        <p:spPr>
+          <a:xfrm>
+            <a:off x="4038600" y="6356350"/>
+            <a:ext cx="4114800" cy="365125"/>
+          </a:xfrm>
+        </p:spPr>
+        <p:txBody>
+          <a:bodyPr vert="horz" lIns="91440" tIns="45720" rIns="91440" bIns="45720" rtlCol="0" anchor="ctr">
+            <a:normAutofit/>
+          </a:bodyPr>
+          <a:lstStyle/>
+          <a:p>
+            <a:endParaRPr lang="en-US" sz="1200" kern="1200">
+              <a:solidFill>
+                <a:srgbClr val="FFFFFF"/>
+              </a:solidFill>
+              <a:latin typeface="+mn-lt"/>
+              <a:ea typeface="+mn-ea"/>
+              <a:cs typeface="+mn-cs"/>
+            </a:endParaRPr>
+          </a:p>
+        </p:txBody>
+      </p:sp>
+      <p:sp>
+        <p:nvSpPr>
+          <p:cNvPr id="5" name="Slide Number Placeholder 4">
+            <a:extLst>
+              <a:ext uri="{FF2B5EF4-FFF2-40B4-BE49-F238E27FC236}">
+                <a16:creationId xmlns:a16="http://schemas.microsoft.com/office/drawing/2014/main" id="{2376D585-0BC8-EF43-889A-953CD8E2910D}"/>
+              </a:ext>
+            </a:extLst>
+          </p:cNvPr>
+          <p:cNvSpPr>
+            <a:spLocks noGrp="1"/>
+          </p:cNvSpPr>
+          <p:nvPr>
+            <p:ph type="sldNum" sz="quarter" idx="12"/>
+          </p:nvPr>
+        </p:nvSpPr>
+        <p:spPr>
+          <a:xfrm>
+            <a:off x="8610600" y="6356350"/>
+            <a:ext cx="2743200" cy="365125"/>
+          </a:xfrm>
+        </p:spPr>
+        <p:txBody>
+          <a:bodyPr vert="horz" lIns="91440" tIns="45720" rIns="91440" bIns="45720" rtlCol="0" anchor="ctr">
+            <a:normAutofit/>
+          </a:bodyPr>
+          <a:lstStyle/>
+          <a:p>
+            <a:fld id="{05072F42-4DFA-4725-86F9-7594E4AB4EB5}" type="slidenum">
+              <a:rPr lang="en-US">
+                <a:solidFill>
+                  <a:srgbClr val="FFFFFF"/>
+                </a:solidFill>
+                <a:latin typeface="+mn-lt"/>
+              </a:rPr>
+              <a:pPr/>
+              <a:t>3</a:t>
+            </a:fld>
+            <a:endParaRPr lang="en-US">
+              <a:solidFill>
+                <a:srgbClr val="FFFFFF"/>
+              </a:solidFill>
+              <a:latin typeface="+mn-lt"/>
+            </a:endParaRPr>
+          </a:p>
+        </p:txBody>
+      </p:sp>
+    </p:spTree>
+    <p:extLst>
+      <p:ext uri="{BB962C8B-B14F-4D97-AF65-F5344CB8AC3E}">
+        <p14:creationId xmlns:p14="http://schemas.microsoft.com/office/powerpoint/2010/main" val="1238113197"/>
+      </p:ext>
+    </p:extLst>
+  </p:cSld>
+  <p:clrMapOvr>
+    <a:masterClrMapping/>
+  </p:clrMapOvr>
+</p:sld>
+</file>
+
+<file path=ppt/slides/slide8.xml><?xml version="1.0" encoding="utf-8"?>
+<p:sld xmlns:a="http://schemas.openxmlformats.org/drawingml/2006/main" xmlns:r="http://schemas.openxmlformats.org/officeDocument/2006/relationships" xmlns:p="http://schemas.openxmlformats.org/presentationml/2006/main">
+  <p:cSld>
+    <p:spTree>
+      <p:nvGrpSpPr>
+        <p:cNvPr id="1" name=""/>
+        <p:cNvGrpSpPr/>
+        <p:nvPr/>
+      </p:nvGrpSpPr>
+      <p:grpSpPr>
+        <a:xfrm>
+          <a:off x="0" y="0"/>
+          <a:ext cx="0" cy="0"/>
+          <a:chOff x="0" y="0"/>
+          <a:chExt cx="0" cy="0"/>
+        </a:xfrm>
+      </p:grpSpPr>
+      <p:sp>
+        <p:nvSpPr>
+          <p:cNvPr id="2" name="Title 1">
+            <a:extLst>
+              <a:ext uri="{FF2B5EF4-FFF2-40B4-BE49-F238E27FC236}">
                 <a16:creationId xmlns:a16="http://schemas.microsoft.com/office/drawing/2014/main" id="{149117BA-DC69-EE40-820D-2383D5BEFC43}"/>
               </a:ext>
             </a:extLst>
@@ -8779,7 +10855,7 @@
 </p:sld>
 </file>
 
-<file path=ppt/slides/slide6.xml><?xml version="1.0" encoding="utf-8"?>
+<file path=ppt/slides/slide9.xml><?xml version="1.0" encoding="utf-8"?>
 <p:sld xmlns:a="http://schemas.openxmlformats.org/drawingml/2006/main" xmlns:r="http://schemas.openxmlformats.org/officeDocument/2006/relationships" xmlns:p="http://schemas.openxmlformats.org/presentationml/2006/main">
   <p:cSld>
     <p:spTree>
@@ -9483,634 +11559,6 @@
     <p:extLst>
       <p:ext uri="{BB962C8B-B14F-4D97-AF65-F5344CB8AC3E}">
         <p14:creationId xmlns:p14="http://schemas.microsoft.com/office/powerpoint/2010/main" val="1215523562"/>
-      </p:ext>
-    </p:extLst>
-  </p:cSld>
-  <p:clrMapOvr>
-    <a:masterClrMapping/>
-  </p:clrMapOvr>
-</p:sld>
-</file>
-
-<file path=ppt/slides/slide7.xml><?xml version="1.0" encoding="utf-8"?>
-<p:sld xmlns:a="http://schemas.openxmlformats.org/drawingml/2006/main" xmlns:r="http://schemas.openxmlformats.org/officeDocument/2006/relationships" xmlns:p="http://schemas.openxmlformats.org/presentationml/2006/main">
-  <p:cSld>
-    <p:spTree>
-      <p:nvGrpSpPr>
-        <p:cNvPr id="1" name=""/>
-        <p:cNvGrpSpPr/>
-        <p:nvPr/>
-      </p:nvGrpSpPr>
-      <p:grpSpPr>
-        <a:xfrm>
-          <a:off x="0" y="0"/>
-          <a:ext cx="0" cy="0"/>
-          <a:chOff x="0" y="0"/>
-          <a:chExt cx="0" cy="0"/>
-        </a:xfrm>
-      </p:grpSpPr>
-      <p:sp>
-        <p:nvSpPr>
-          <p:cNvPr id="2" name="Title 1">
-            <a:extLst>
-              <a:ext uri="{FF2B5EF4-FFF2-40B4-BE49-F238E27FC236}">
-                <a16:creationId xmlns:a16="http://schemas.microsoft.com/office/drawing/2014/main" id="{149117BA-DC69-EE40-820D-2383D5BEFC43}"/>
-              </a:ext>
-            </a:extLst>
-          </p:cNvPr>
-          <p:cNvSpPr>
-            <a:spLocks noGrp="1"/>
-          </p:cNvSpPr>
-          <p:nvPr>
-            <p:ph type="title"/>
-          </p:nvPr>
-        </p:nvSpPr>
-        <p:spPr>
-          <a:xfrm>
-            <a:off x="838200" y="695986"/>
-            <a:ext cx="10515600" cy="1325563"/>
-          </a:xfrm>
-        </p:spPr>
-        <p:txBody>
-          <a:bodyPr/>
-          <a:lstStyle/>
-          <a:p>
-            <a:r>
-              <a:rPr lang="en-US" dirty="0"/>
-              <a:t>Custom events</a:t>
-            </a:r>
-          </a:p>
-        </p:txBody>
-      </p:sp>
-      <p:sp>
-        <p:nvSpPr>
-          <p:cNvPr id="3" name="Content Placeholder 2">
-            <a:extLst>
-              <a:ext uri="{FF2B5EF4-FFF2-40B4-BE49-F238E27FC236}">
-                <a16:creationId xmlns:a16="http://schemas.microsoft.com/office/drawing/2014/main" id="{49A60402-E9D3-3C4B-B9DD-F3635E766DAD}"/>
-              </a:ext>
-            </a:extLst>
-          </p:cNvPr>
-          <p:cNvSpPr>
-            <a:spLocks noGrp="1"/>
-          </p:cNvSpPr>
-          <p:nvPr>
-            <p:ph idx="1"/>
-          </p:nvPr>
-        </p:nvSpPr>
-        <p:spPr/>
-        <p:txBody>
-          <a:bodyPr/>
-          <a:lstStyle/>
-          <a:p>
-            <a:r>
-              <a:rPr lang="en-US" dirty="0"/>
-              <a:t>Sending a new note/delete note event</a:t>
-            </a:r>
-          </a:p>
-          <a:p>
-            <a:endParaRPr lang="en-US" dirty="0"/>
-          </a:p>
-        </p:txBody>
-      </p:sp>
-      <p:sp>
-        <p:nvSpPr>
-          <p:cNvPr id="6" name="Rectangle 5">
-            <a:extLst>
-              <a:ext uri="{FF2B5EF4-FFF2-40B4-BE49-F238E27FC236}">
-                <a16:creationId xmlns:a16="http://schemas.microsoft.com/office/drawing/2014/main" id="{E007DE48-D83D-E043-A459-52149D0D4844}"/>
-              </a:ext>
-            </a:extLst>
-          </p:cNvPr>
-          <p:cNvSpPr/>
-          <p:nvPr/>
-        </p:nvSpPr>
-        <p:spPr>
-          <a:xfrm>
-            <a:off x="265426" y="2918714"/>
-            <a:ext cx="11661147" cy="2985976"/>
-          </a:xfrm>
-          <a:prstGeom prst="rect">
-            <a:avLst/>
-          </a:prstGeom>
-          <a:solidFill>
-            <a:schemeClr val="bg1">
-              <a:lumMod val="85000"/>
-            </a:schemeClr>
-          </a:solidFill>
-        </p:spPr>
-        <p:style>
-          <a:lnRef idx="2">
-            <a:schemeClr val="accent1">
-              <a:shade val="50000"/>
-            </a:schemeClr>
-          </a:lnRef>
-          <a:fillRef idx="1">
-            <a:schemeClr val="accent1"/>
-          </a:fillRef>
-          <a:effectRef idx="0">
-            <a:schemeClr val="accent1"/>
-          </a:effectRef>
-          <a:fontRef idx="minor">
-            <a:schemeClr val="lt1"/>
-          </a:fontRef>
-        </p:style>
-        <p:txBody>
-          <a:bodyPr rtlCol="0" anchor="t"/>
-          <a:lstStyle/>
-          <a:p>
-            <a:pPr algn="l"/>
-            <a:r>
-              <a:rPr lang="en-AU" sz="1600" dirty="0">
-                <a:solidFill>
-                  <a:schemeClr val="tx1"/>
-                </a:solidFill>
-              </a:rPr>
-              <a:t>// send add note event</a:t>
-            </a:r>
-          </a:p>
-          <a:p>
-            <a:pPr algn="l"/>
-            <a:endParaRPr lang="en-AU" sz="1600" dirty="0">
-              <a:solidFill>
-                <a:schemeClr val="tx1"/>
-              </a:solidFill>
-            </a:endParaRPr>
-          </a:p>
-          <a:p>
-            <a:pPr algn="l"/>
-            <a:r>
-              <a:rPr lang="en-AU" sz="1600" dirty="0" err="1">
-                <a:solidFill>
-                  <a:schemeClr val="tx1"/>
-                </a:solidFill>
-              </a:rPr>
-              <a:t>sendNoteEvent</a:t>
-            </a:r>
-            <a:r>
-              <a:rPr lang="en-AU" sz="1600" dirty="0">
-                <a:solidFill>
-                  <a:schemeClr val="tx1"/>
-                </a:solidFill>
-              </a:rPr>
-              <a:t>(</a:t>
-            </a:r>
-            <a:r>
-              <a:rPr lang="en-AU" sz="1600" dirty="0" err="1">
-                <a:solidFill>
-                  <a:schemeClr val="tx1"/>
-                </a:solidFill>
-              </a:rPr>
-              <a:t>noteId</a:t>
-            </a:r>
-            <a:r>
-              <a:rPr lang="en-AU" sz="1600" dirty="0">
-                <a:solidFill>
-                  <a:schemeClr val="tx1"/>
-                </a:solidFill>
-              </a:rPr>
-              <a:t>: </a:t>
-            </a:r>
-            <a:r>
-              <a:rPr lang="en-AU" sz="1600" dirty="0" err="1">
-                <a:solidFill>
-                  <a:schemeClr val="tx1"/>
-                </a:solidFill>
-              </a:rPr>
-              <a:t>newNoteId</a:t>
-            </a:r>
-            <a:r>
-              <a:rPr lang="en-AU" sz="1600" dirty="0">
-                <a:solidFill>
-                  <a:schemeClr val="tx1"/>
-                </a:solidFill>
-              </a:rPr>
-              <a:t>, </a:t>
-            </a:r>
-            <a:r>
-              <a:rPr lang="en-AU" sz="1600" dirty="0" err="1">
-                <a:solidFill>
-                  <a:schemeClr val="tx1"/>
-                </a:solidFill>
-              </a:rPr>
-              <a:t>eventType</a:t>
-            </a:r>
-            <a:r>
-              <a:rPr lang="en-AU" sz="1600" dirty="0">
-                <a:solidFill>
-                  <a:schemeClr val="tx1"/>
-                </a:solidFill>
-              </a:rPr>
-              <a:t>: </a:t>
-            </a:r>
-            <a:r>
-              <a:rPr lang="en-AU" sz="1600" dirty="0" err="1">
-                <a:solidFill>
-                  <a:schemeClr val="tx1"/>
-                </a:solidFill>
-              </a:rPr>
-              <a:t>noteEventType.AddNote.rawValue</a:t>
-            </a:r>
-            <a:r>
-              <a:rPr lang="en-AU" sz="1600" dirty="0">
-                <a:solidFill>
-                  <a:schemeClr val="tx1"/>
-                </a:solidFill>
-              </a:rPr>
-              <a:t>) </a:t>
-            </a:r>
-          </a:p>
-          <a:p>
-            <a:pPr algn="l"/>
-            <a:endParaRPr lang="en-AU" sz="1600" dirty="0">
-              <a:solidFill>
-                <a:schemeClr val="tx1"/>
-              </a:solidFill>
-            </a:endParaRPr>
-          </a:p>
-          <a:p>
-            <a:pPr algn="l"/>
-            <a:r>
-              <a:rPr lang="en-AU" sz="1600" dirty="0">
-                <a:solidFill>
-                  <a:schemeClr val="tx1"/>
-                </a:solidFill>
-              </a:rPr>
-              <a:t>// send delete note event</a:t>
-            </a:r>
-          </a:p>
-          <a:p>
-            <a:pPr algn="l"/>
-            <a:endParaRPr lang="en-AU" sz="1600" dirty="0">
-              <a:solidFill>
-                <a:schemeClr val="tx1"/>
-              </a:solidFill>
-            </a:endParaRPr>
-          </a:p>
-          <a:p>
-            <a:pPr algn="l"/>
-            <a:r>
-              <a:rPr lang="en-AU" sz="1600" dirty="0" err="1">
-                <a:solidFill>
-                  <a:schemeClr val="tx1"/>
-                </a:solidFill>
-              </a:rPr>
-              <a:t>sendNoteEvent</a:t>
-            </a:r>
-            <a:r>
-              <a:rPr lang="en-AU" sz="1600" dirty="0">
-                <a:solidFill>
-                  <a:schemeClr val="tx1"/>
-                </a:solidFill>
-              </a:rPr>
-              <a:t>(</a:t>
-            </a:r>
-            <a:r>
-              <a:rPr lang="en-AU" sz="1600" dirty="0" err="1">
-                <a:solidFill>
-                  <a:schemeClr val="tx1"/>
-                </a:solidFill>
-              </a:rPr>
-              <a:t>noteId</a:t>
-            </a:r>
-            <a:r>
-              <a:rPr lang="en-AU" sz="1600" dirty="0">
-                <a:solidFill>
-                  <a:schemeClr val="tx1"/>
-                </a:solidFill>
-              </a:rPr>
-              <a:t>: </a:t>
-            </a:r>
-            <a:r>
-              <a:rPr lang="en-AU" sz="1600" dirty="0" err="1">
-                <a:solidFill>
-                  <a:schemeClr val="tx1"/>
-                </a:solidFill>
-              </a:rPr>
-              <a:t>newNoteId</a:t>
-            </a:r>
-            <a:r>
-              <a:rPr lang="en-AU" sz="1600" dirty="0">
-                <a:solidFill>
-                  <a:schemeClr val="tx1"/>
-                </a:solidFill>
-              </a:rPr>
-              <a:t>, </a:t>
-            </a:r>
-            <a:r>
-              <a:rPr lang="en-AU" sz="1600" dirty="0" err="1">
-                <a:solidFill>
-                  <a:schemeClr val="tx1"/>
-                </a:solidFill>
-              </a:rPr>
-              <a:t>eventType</a:t>
-            </a:r>
-            <a:r>
-              <a:rPr lang="en-AU" sz="1600" dirty="0">
-                <a:solidFill>
-                  <a:schemeClr val="tx1"/>
-                </a:solidFill>
-              </a:rPr>
-              <a:t>: </a:t>
-            </a:r>
-            <a:r>
-              <a:rPr lang="en-AU" sz="1600" dirty="0" err="1">
-                <a:solidFill>
-                  <a:schemeClr val="tx1"/>
-                </a:solidFill>
-              </a:rPr>
-              <a:t>noteEventType.DeleteNote.rawValue</a:t>
-            </a:r>
-            <a:r>
-              <a:rPr lang="en-AU" sz="1600" dirty="0">
-                <a:solidFill>
-                  <a:schemeClr val="tx1"/>
-                </a:solidFill>
-              </a:rPr>
-              <a:t>) </a:t>
-            </a:r>
-          </a:p>
-          <a:p>
-            <a:pPr algn="l"/>
-            <a:endParaRPr lang="en-AU" sz="1600" dirty="0">
-              <a:solidFill>
-                <a:schemeClr val="tx1"/>
-              </a:solidFill>
-            </a:endParaRPr>
-          </a:p>
-        </p:txBody>
-      </p:sp>
-    </p:spTree>
-    <p:extLst>
-      <p:ext uri="{BB962C8B-B14F-4D97-AF65-F5344CB8AC3E}">
-        <p14:creationId xmlns:p14="http://schemas.microsoft.com/office/powerpoint/2010/main" val="1564198555"/>
-      </p:ext>
-    </p:extLst>
-  </p:cSld>
-  <p:clrMapOvr>
-    <a:masterClrMapping/>
-  </p:clrMapOvr>
-</p:sld>
-</file>
-
-<file path=ppt/slides/slide8.xml><?xml version="1.0" encoding="utf-8"?>
-<p:sld xmlns:a="http://schemas.openxmlformats.org/drawingml/2006/main" xmlns:r="http://schemas.openxmlformats.org/officeDocument/2006/relationships" xmlns:p="http://schemas.openxmlformats.org/presentationml/2006/main">
-  <p:cSld>
-    <p:spTree>
-      <p:nvGrpSpPr>
-        <p:cNvPr id="1" name=""/>
-        <p:cNvGrpSpPr/>
-        <p:nvPr/>
-      </p:nvGrpSpPr>
-      <p:grpSpPr>
-        <a:xfrm>
-          <a:off x="0" y="0"/>
-          <a:ext cx="0" cy="0"/>
-          <a:chOff x="0" y="0"/>
-          <a:chExt cx="0" cy="0"/>
-        </a:xfrm>
-      </p:grpSpPr>
-      <p:sp>
-        <p:nvSpPr>
-          <p:cNvPr id="2" name="Title 1">
-            <a:extLst>
-              <a:ext uri="{FF2B5EF4-FFF2-40B4-BE49-F238E27FC236}">
-                <a16:creationId xmlns:a16="http://schemas.microsoft.com/office/drawing/2014/main" id="{6E6C3106-75CE-2444-A152-F4B23594B758}"/>
-              </a:ext>
-            </a:extLst>
-          </p:cNvPr>
-          <p:cNvSpPr>
-            <a:spLocks noGrp="1"/>
-          </p:cNvSpPr>
-          <p:nvPr>
-            <p:ph type="title"/>
-          </p:nvPr>
-        </p:nvSpPr>
-        <p:spPr/>
-        <p:txBody>
-          <a:bodyPr/>
-          <a:lstStyle/>
-          <a:p>
-            <a:r>
-              <a:rPr lang="en-US" dirty="0"/>
-              <a:t>Tracking events in Pinpoint</a:t>
-            </a:r>
-          </a:p>
-        </p:txBody>
-      </p:sp>
-      <p:pic>
-        <p:nvPicPr>
-          <p:cNvPr id="7" name="Content Placeholder 6">
-            <a:extLst>
-              <a:ext uri="{FF2B5EF4-FFF2-40B4-BE49-F238E27FC236}">
-                <a16:creationId xmlns:a16="http://schemas.microsoft.com/office/drawing/2014/main" id="{63DD23CE-56BB-B748-8EB5-B3B4A00BAEBE}"/>
-              </a:ext>
-            </a:extLst>
-          </p:cNvPr>
-          <p:cNvPicPr>
-            <a:picLocks noGrp="1" noChangeAspect="1"/>
-          </p:cNvPicPr>
-          <p:nvPr>
-            <p:ph idx="1"/>
-          </p:nvPr>
-        </p:nvPicPr>
-        <p:blipFill>
-          <a:blip r:embed="rId3">
-            <a:extLst>
-              <a:ext uri="{28A0092B-C50C-407E-A947-70E740481C1C}">
-                <a14:useLocalDpi xmlns:a14="http://schemas.microsoft.com/office/drawing/2010/main" val="0"/>
-              </a:ext>
-            </a:extLst>
-          </a:blip>
-          <a:stretch>
-            <a:fillRect/>
-          </a:stretch>
-        </p:blipFill>
-        <p:spPr>
-          <a:xfrm>
-            <a:off x="1429253" y="1482725"/>
-            <a:ext cx="9126939" cy="5238750"/>
-          </a:xfrm>
-        </p:spPr>
-      </p:pic>
-      <p:sp>
-        <p:nvSpPr>
-          <p:cNvPr id="4" name="Footer Placeholder 3">
-            <a:extLst>
-              <a:ext uri="{FF2B5EF4-FFF2-40B4-BE49-F238E27FC236}">
-                <a16:creationId xmlns:a16="http://schemas.microsoft.com/office/drawing/2014/main" id="{E8BC6FD3-C7A2-3D4F-B63A-7BBF72C7FA58}"/>
-              </a:ext>
-            </a:extLst>
-          </p:cNvPr>
-          <p:cNvSpPr>
-            <a:spLocks noGrp="1"/>
-          </p:cNvSpPr>
-          <p:nvPr>
-            <p:ph type="ftr" sz="quarter" idx="11"/>
-          </p:nvPr>
-        </p:nvSpPr>
-        <p:spPr/>
-        <p:txBody>
-          <a:bodyPr/>
-          <a:lstStyle/>
-          <a:p>
-            <a:endParaRPr lang="en-GB" dirty="0"/>
-          </a:p>
-        </p:txBody>
-      </p:sp>
-    </p:spTree>
-    <p:extLst>
-      <p:ext uri="{BB962C8B-B14F-4D97-AF65-F5344CB8AC3E}">
-        <p14:creationId xmlns:p14="http://schemas.microsoft.com/office/powerpoint/2010/main" val="2221828129"/>
-      </p:ext>
-    </p:extLst>
-  </p:cSld>
-  <p:clrMapOvr>
-    <a:masterClrMapping/>
-  </p:clrMapOvr>
-</p:sld>
-</file>
-
-<file path=ppt/slides/slide9.xml><?xml version="1.0" encoding="utf-8"?>
-<p:sld xmlns:a="http://schemas.openxmlformats.org/drawingml/2006/main" xmlns:r="http://schemas.openxmlformats.org/officeDocument/2006/relationships" xmlns:p="http://schemas.openxmlformats.org/presentationml/2006/main">
-  <p:cSld>
-    <p:spTree>
-      <p:nvGrpSpPr>
-        <p:cNvPr id="1" name=""/>
-        <p:cNvGrpSpPr/>
-        <p:nvPr/>
-      </p:nvGrpSpPr>
-      <p:grpSpPr>
-        <a:xfrm>
-          <a:off x="0" y="0"/>
-          <a:ext cx="0" cy="0"/>
-          <a:chOff x="0" y="0"/>
-          <a:chExt cx="0" cy="0"/>
-        </a:xfrm>
-      </p:grpSpPr>
-      <p:sp>
-        <p:nvSpPr>
-          <p:cNvPr id="2" name="Title 1">
-            <a:extLst>
-              <a:ext uri="{FF2B5EF4-FFF2-40B4-BE49-F238E27FC236}">
-                <a16:creationId xmlns:a16="http://schemas.microsoft.com/office/drawing/2014/main" id="{6E6C3106-75CE-2444-A152-F4B23594B758}"/>
-              </a:ext>
-            </a:extLst>
-          </p:cNvPr>
-          <p:cNvSpPr>
-            <a:spLocks noGrp="1"/>
-          </p:cNvSpPr>
-          <p:nvPr>
-            <p:ph type="title"/>
-          </p:nvPr>
-        </p:nvSpPr>
-        <p:spPr/>
-        <p:txBody>
-          <a:bodyPr/>
-          <a:lstStyle/>
-          <a:p>
-            <a:r>
-              <a:rPr lang="en-US" dirty="0"/>
-              <a:t>Other things you can do</a:t>
-            </a:r>
-          </a:p>
-        </p:txBody>
-      </p:sp>
-      <p:sp>
-        <p:nvSpPr>
-          <p:cNvPr id="4" name="Footer Placeholder 3">
-            <a:extLst>
-              <a:ext uri="{FF2B5EF4-FFF2-40B4-BE49-F238E27FC236}">
-                <a16:creationId xmlns:a16="http://schemas.microsoft.com/office/drawing/2014/main" id="{E8BC6FD3-C7A2-3D4F-B63A-7BBF72C7FA58}"/>
-              </a:ext>
-            </a:extLst>
-          </p:cNvPr>
-          <p:cNvSpPr>
-            <a:spLocks noGrp="1"/>
-          </p:cNvSpPr>
-          <p:nvPr>
-            <p:ph type="ftr" sz="quarter" idx="11"/>
-          </p:nvPr>
-        </p:nvSpPr>
-        <p:spPr/>
-        <p:txBody>
-          <a:bodyPr/>
-          <a:lstStyle/>
-          <a:p>
-            <a:endParaRPr lang="en-GB" dirty="0"/>
-          </a:p>
-        </p:txBody>
-      </p:sp>
-      <p:sp>
-        <p:nvSpPr>
-          <p:cNvPr id="5" name="Content Placeholder 4">
-            <a:extLst>
-              <a:ext uri="{FF2B5EF4-FFF2-40B4-BE49-F238E27FC236}">
-                <a16:creationId xmlns:a16="http://schemas.microsoft.com/office/drawing/2014/main" id="{E476D087-EC71-324D-A51A-2584F4073E79}"/>
-              </a:ext>
-            </a:extLst>
-          </p:cNvPr>
-          <p:cNvSpPr>
-            <a:spLocks noGrp="1"/>
-          </p:cNvSpPr>
-          <p:nvPr>
-            <p:ph idx="1"/>
-          </p:nvPr>
-        </p:nvSpPr>
-        <p:spPr/>
-        <p:txBody>
-          <a:bodyPr/>
-          <a:lstStyle/>
-          <a:p>
-            <a:r>
-              <a:rPr lang="en-US" dirty="0"/>
-              <a:t>Funnels</a:t>
-            </a:r>
-          </a:p>
-          <a:p>
-            <a:pPr lvl="1"/>
-            <a:r>
-              <a:rPr lang="en-US" dirty="0"/>
-              <a:t>Allows you to track how many users complete a certain series of events</a:t>
-            </a:r>
-          </a:p>
-          <a:p>
-            <a:r>
-              <a:rPr lang="en-US" dirty="0"/>
-              <a:t>Revenue</a:t>
-            </a:r>
-          </a:p>
-          <a:p>
-            <a:pPr lvl="1"/>
-            <a:r>
-              <a:rPr lang="en-US" dirty="0"/>
-              <a:t>Summary of “monetization events” app sends</a:t>
-            </a:r>
-          </a:p>
-          <a:p>
-            <a:r>
-              <a:rPr lang="en-US" dirty="0"/>
-              <a:t>Demographics</a:t>
-            </a:r>
-          </a:p>
-          <a:p>
-            <a:pPr lvl="1"/>
-            <a:r>
-              <a:rPr lang="en-US" dirty="0"/>
-              <a:t>Details of the platforms, phones, OSs </a:t>
-            </a:r>
-            <a:r>
-              <a:rPr lang="en-US" dirty="0" err="1"/>
-              <a:t>etc</a:t>
-            </a:r>
-            <a:endParaRPr lang="en-US" dirty="0"/>
-          </a:p>
-        </p:txBody>
-      </p:sp>
-    </p:spTree>
-    <p:extLst>
-      <p:ext uri="{BB962C8B-B14F-4D97-AF65-F5344CB8AC3E}">
-        <p14:creationId xmlns:p14="http://schemas.microsoft.com/office/powerpoint/2010/main" val="4087075561"/>
       </p:ext>
     </p:extLst>
   </p:cSld>

</xml_diff>